<commit_message>
updated figure 1:45.1-2 to remove extra white space
</commit_message>
<xml_diff>
--- a/input/images-source/4512.pptx
+++ b/input/images-source/4512.pptx
@@ -243,7 +243,7 @@
           <a:p>
             <a:fld id="{B0885B1E-572B-4AB4-875A-6F425810BF11}" type="datetimeFigureOut">
               <a:rPr lang="en-US" smtClean="0"/>
-              <a:t>1/12/2023</a:t>
+              <a:t>1/18/2023</a:t>
             </a:fld>
             <a:endParaRPr lang="en-US"/>
           </a:p>
@@ -413,7 +413,7 @@
           <a:p>
             <a:fld id="{B0885B1E-572B-4AB4-875A-6F425810BF11}" type="datetimeFigureOut">
               <a:rPr lang="en-US" smtClean="0"/>
-              <a:t>1/12/2023</a:t>
+              <a:t>1/18/2023</a:t>
             </a:fld>
             <a:endParaRPr lang="en-US"/>
           </a:p>
@@ -593,7 +593,7 @@
           <a:p>
             <a:fld id="{B0885B1E-572B-4AB4-875A-6F425810BF11}" type="datetimeFigureOut">
               <a:rPr lang="en-US" smtClean="0"/>
-              <a:t>1/12/2023</a:t>
+              <a:t>1/18/2023</a:t>
             </a:fld>
             <a:endParaRPr lang="en-US"/>
           </a:p>
@@ -763,7 +763,7 @@
           <a:p>
             <a:fld id="{B0885B1E-572B-4AB4-875A-6F425810BF11}" type="datetimeFigureOut">
               <a:rPr lang="en-US" smtClean="0"/>
-              <a:t>1/12/2023</a:t>
+              <a:t>1/18/2023</a:t>
             </a:fld>
             <a:endParaRPr lang="en-US"/>
           </a:p>
@@ -1007,7 +1007,7 @@
           <a:p>
             <a:fld id="{B0885B1E-572B-4AB4-875A-6F425810BF11}" type="datetimeFigureOut">
               <a:rPr lang="en-US" smtClean="0"/>
-              <a:t>1/12/2023</a:t>
+              <a:t>1/18/2023</a:t>
             </a:fld>
             <a:endParaRPr lang="en-US"/>
           </a:p>
@@ -1239,7 +1239,7 @@
           <a:p>
             <a:fld id="{B0885B1E-572B-4AB4-875A-6F425810BF11}" type="datetimeFigureOut">
               <a:rPr lang="en-US" smtClean="0"/>
-              <a:t>1/12/2023</a:t>
+              <a:t>1/18/2023</a:t>
             </a:fld>
             <a:endParaRPr lang="en-US"/>
           </a:p>
@@ -1606,7 +1606,7 @@
           <a:p>
             <a:fld id="{B0885B1E-572B-4AB4-875A-6F425810BF11}" type="datetimeFigureOut">
               <a:rPr lang="en-US" smtClean="0"/>
-              <a:t>1/12/2023</a:t>
+              <a:t>1/18/2023</a:t>
             </a:fld>
             <a:endParaRPr lang="en-US"/>
           </a:p>
@@ -1724,7 +1724,7 @@
           <a:p>
             <a:fld id="{B0885B1E-572B-4AB4-875A-6F425810BF11}" type="datetimeFigureOut">
               <a:rPr lang="en-US" smtClean="0"/>
-              <a:t>1/12/2023</a:t>
+              <a:t>1/18/2023</a:t>
             </a:fld>
             <a:endParaRPr lang="en-US"/>
           </a:p>
@@ -1819,7 +1819,7 @@
           <a:p>
             <a:fld id="{B0885B1E-572B-4AB4-875A-6F425810BF11}" type="datetimeFigureOut">
               <a:rPr lang="en-US" smtClean="0"/>
-              <a:t>1/12/2023</a:t>
+              <a:t>1/18/2023</a:t>
             </a:fld>
             <a:endParaRPr lang="en-US"/>
           </a:p>
@@ -2096,7 +2096,7 @@
           <a:p>
             <a:fld id="{B0885B1E-572B-4AB4-875A-6F425810BF11}" type="datetimeFigureOut">
               <a:rPr lang="en-US" smtClean="0"/>
-              <a:t>1/12/2023</a:t>
+              <a:t>1/18/2023</a:t>
             </a:fld>
             <a:endParaRPr lang="en-US"/>
           </a:p>
@@ -2353,7 +2353,7 @@
           <a:p>
             <a:fld id="{B0885B1E-572B-4AB4-875A-6F425810BF11}" type="datetimeFigureOut">
               <a:rPr lang="en-US" smtClean="0"/>
-              <a:t>1/12/2023</a:t>
+              <a:t>1/18/2023</a:t>
             </a:fld>
             <a:endParaRPr lang="en-US"/>
           </a:p>
@@ -2566,7 +2566,7 @@
           <a:p>
             <a:fld id="{B0885B1E-572B-4AB4-875A-6F425810BF11}" type="datetimeFigureOut">
               <a:rPr lang="en-US" smtClean="0"/>
-              <a:t>1/12/2023</a:t>
+              <a:t>1/18/2023</a:t>
             </a:fld>
             <a:endParaRPr lang="en-US"/>
           </a:p>
@@ -2971,75 +2971,6 @@
           <a:chExt cx="0" cy="0"/>
         </a:xfrm>
       </p:grpSpPr>
-      <p:sp>
-        <p:nvSpPr>
-          <p:cNvPr id="2" name="Rectangle 23">
-            <a:extLst>
-              <a:ext uri="{FF2B5EF4-FFF2-40B4-BE49-F238E27FC236}">
-                <a16:creationId xmlns:a16="http://schemas.microsoft.com/office/drawing/2014/main" id="{CB4B201A-56E1-5D92-346D-1125A5341EB7}"/>
-              </a:ext>
-            </a:extLst>
-          </p:cNvPr>
-          <p:cNvSpPr>
-            <a:spLocks noChangeArrowheads="1"/>
-          </p:cNvSpPr>
-          <p:nvPr/>
-        </p:nvSpPr>
-        <p:spPr bwMode="auto">
-          <a:xfrm>
-            <a:off x="1816360" y="1667461"/>
-            <a:ext cx="184731" cy="369332"/>
-          </a:xfrm>
-          <a:prstGeom prst="rect">
-            <a:avLst/>
-          </a:prstGeom>
-          <a:noFill/>
-          <a:ln>
-            <a:noFill/>
-          </a:ln>
-          <a:effectLst/>
-          <a:extLst>
-            <a:ext uri="{909E8E84-426E-40DD-AFC4-6F175D3DCCD1}">
-              <a14:hiddenFill xmlns:a14="http://schemas.microsoft.com/office/drawing/2010/main">
-                <a:solidFill>
-                  <a:schemeClr val="accent1"/>
-                </a:solidFill>
-              </a14:hiddenFill>
-            </a:ext>
-            <a:ext uri="{91240B29-F687-4F45-9708-019B960494DF}">
-              <a14:hiddenLine xmlns:a14="http://schemas.microsoft.com/office/drawing/2010/main" w="9525">
-                <a:solidFill>
-                  <a:schemeClr val="tx1"/>
-                </a:solidFill>
-                <a:miter lim="800000"/>
-                <a:headEnd/>
-                <a:tailEnd/>
-              </a14:hiddenLine>
-            </a:ext>
-            <a:ext uri="{AF507438-7753-43E0-B8FC-AC1667EBCBE1}">
-              <a14:hiddenEffects xmlns:a14="http://schemas.microsoft.com/office/drawing/2010/main">
-                <a:effectLst>
-                  <a:outerShdw dist="35921" dir="2700000" algn="ctr" rotWithShape="0">
-                    <a:schemeClr val="bg2"/>
-                  </a:outerShdw>
-                </a:effectLst>
-              </a14:hiddenEffects>
-            </a:ext>
-          </a:extLst>
-        </p:spPr>
-        <p:txBody>
-          <a:bodyPr vert="horz" wrap="none" lIns="91440" tIns="45720" rIns="91440" bIns="45720" numCol="1" anchor="ctr" anchorCtr="0" compatLnSpc="1">
-            <a:prstTxWarp prst="textNoShape">
-              <a:avLst/>
-            </a:prstTxWarp>
-            <a:spAutoFit/>
-          </a:bodyPr>
-          <a:lstStyle/>
-          <a:p>
-            <a:endParaRPr lang="en-US"/>
-          </a:p>
-        </p:txBody>
-      </p:sp>
       <p:grpSp>
         <p:nvGrpSpPr>
           <p:cNvPr id="3" name="Canvas 2178">
@@ -3128,7 +3059,7 @@
             </a:ln>
             <a:extLst>
               <a:ext uri="{909E8E84-426E-40dd-AFC4-6F175D3DCCD1}">
-                <a14:hiddenFill xmlns:lc="http://schemas.openxmlformats.org/drawingml/2006/lockedCanvas" xmlns:arto="http://schemas.microsoft.com/office/word/2006/arto" xmlns="" xmlns:mo="http://schemas.microsoft.com/office/mac/office/2008/main" xmlns:mv="urn:schemas-microsoft-com:mac:vml" xmlns:o="urn:schemas-microsoft-com:office:office" xmlns:v="urn:schemas-microsoft-com:vml" xmlns:w10="urn:schemas-microsoft-com:office:word" xmlns:w="http://schemas.openxmlformats.org/wordprocessingml/2006/main" xmlns:a14="http://schemas.microsoft.com/office/drawing/2010/main" xmlns:w16se="http://schemas.microsoft.com/office/word/2015/wordml/symex" xmlns:w16cid="http://schemas.microsoft.com/office/word/2016/wordml/cid" xmlns:am3d="http://schemas.microsoft.com/office/drawing/2017/model3d" xmlns:aink="http://schemas.microsoft.com/office/drawing/2016/ink" xmlns:cx8="http://schemas.microsoft.com/office/drawing/2016/5/14/chartex" xmlns:cx7="http://schemas.microsoft.com/office/drawing/2016/5/13/chartex" xmlns:cx6="http://schemas.microsoft.com/office/drawing/2016/5/12/chartex" xmlns:cx5="http://schemas.microsoft.com/office/drawing/2016/5/11/chartex" xmlns:cx4="http://schemas.microsoft.com/office/drawing/2016/5/10/chartex" xmlns:cx3="http://schemas.microsoft.com/office/drawing/2016/5/9/chartex" xmlns:cx2="http://schemas.microsoft.com/office/drawing/2015/10/21/chartex" xmlns:cx1="http://schemas.microsoft.com/office/drawing/2015/9/8/chartex" xmlns:cx="http://schemas.microsoft.com/office/drawing/2014/chartex" xmlns:wps="http://schemas.microsoft.com/office/word/2010/wordprocessingShape" xmlns:wne="http://schemas.microsoft.com/office/word/2006/wordml" xmlns:wpi="http://schemas.microsoft.com/office/word/2010/wordprocessingInk" xmlns:wpg="http://schemas.microsoft.com/office/word/2010/wordprocessingGroup" xmlns:w15="http://schemas.microsoft.com/office/word/2012/wordml" xmlns:w14="http://schemas.microsoft.com/office/word/2010/wordml" xmlns:wp="http://schemas.openxmlformats.org/drawingml/2006/wordprocessingDrawing" xmlns:wp14="http://schemas.microsoft.com/office/word/2010/wordprocessingDrawing" xmlns:m="http://schemas.openxmlformats.org/officeDocument/2006/math" xmlns:mc="http://schemas.openxmlformats.org/markup-compatibility/2006" xmlns:wpc="http://schemas.microsoft.com/office/word/2010/wordprocessingCanvas">
+                <a14:hiddenFill xmlns:wpc="http://schemas.microsoft.com/office/word/2010/wordprocessingCanvas" xmlns:mc="http://schemas.openxmlformats.org/markup-compatibility/2006" xmlns:m="http://schemas.openxmlformats.org/officeDocument/2006/math" xmlns:wp14="http://schemas.microsoft.com/office/word/2010/wordprocessingDrawing" xmlns:wp="http://schemas.openxmlformats.org/drawingml/2006/wordprocessingDrawing" xmlns:w14="http://schemas.microsoft.com/office/word/2010/wordml" xmlns:w15="http://schemas.microsoft.com/office/word/2012/wordml" xmlns:wpg="http://schemas.microsoft.com/office/word/2010/wordprocessingGroup" xmlns:wpi="http://schemas.microsoft.com/office/word/2010/wordprocessingInk" xmlns:wne="http://schemas.microsoft.com/office/word/2006/wordml" xmlns:wps="http://schemas.microsoft.com/office/word/2010/wordprocessingShape" xmlns:cx="http://schemas.microsoft.com/office/drawing/2014/chartex" xmlns:cx1="http://schemas.microsoft.com/office/drawing/2015/9/8/chartex" xmlns:cx2="http://schemas.microsoft.com/office/drawing/2015/10/21/chartex" xmlns:cx3="http://schemas.microsoft.com/office/drawing/2016/5/9/chartex" xmlns:cx4="http://schemas.microsoft.com/office/drawing/2016/5/10/chartex" xmlns:cx5="http://schemas.microsoft.com/office/drawing/2016/5/11/chartex" xmlns:cx6="http://schemas.microsoft.com/office/drawing/2016/5/12/chartex" xmlns:cx7="http://schemas.microsoft.com/office/drawing/2016/5/13/chartex" xmlns:cx8="http://schemas.microsoft.com/office/drawing/2016/5/14/chartex" xmlns:aink="http://schemas.microsoft.com/office/drawing/2016/ink" xmlns:am3d="http://schemas.microsoft.com/office/drawing/2017/model3d" xmlns:w16cid="http://schemas.microsoft.com/office/word/2016/wordml/cid" xmlns:w16se="http://schemas.microsoft.com/office/word/2015/wordml/symex" xmlns:a14="http://schemas.microsoft.com/office/drawing/2010/main" xmlns:w="http://schemas.openxmlformats.org/wordprocessingml/2006/main" xmlns:w10="urn:schemas-microsoft-com:office:word" xmlns:v="urn:schemas-microsoft-com:vml" xmlns:o="urn:schemas-microsoft-com:office:office" xmlns:mv="urn:schemas-microsoft-com:mac:vml" xmlns:mo="http://schemas.microsoft.com/office/mac/office/2008/main" xmlns="" xmlns:arto="http://schemas.microsoft.com/office/word/2006/arto" xmlns:lc="http://schemas.openxmlformats.org/drawingml/2006/lockedCanvas">
                   <a:noFill/>
                 </a14:hiddenFill>
               </a:ext>
@@ -3171,7 +3102,7 @@
             </a:ln>
             <a:extLst>
               <a:ext uri="{909E8E84-426E-40dd-AFC4-6F175D3DCCD1}">
-                <a14:hiddenFill xmlns:lc="http://schemas.openxmlformats.org/drawingml/2006/lockedCanvas" xmlns:arto="http://schemas.microsoft.com/office/word/2006/arto" xmlns="" xmlns:mo="http://schemas.microsoft.com/office/mac/office/2008/main" xmlns:mv="urn:schemas-microsoft-com:mac:vml" xmlns:o="urn:schemas-microsoft-com:office:office" xmlns:v="urn:schemas-microsoft-com:vml" xmlns:w10="urn:schemas-microsoft-com:office:word" xmlns:w="http://schemas.openxmlformats.org/wordprocessingml/2006/main" xmlns:a14="http://schemas.microsoft.com/office/drawing/2010/main" xmlns:w16se="http://schemas.microsoft.com/office/word/2015/wordml/symex" xmlns:w16cid="http://schemas.microsoft.com/office/word/2016/wordml/cid" xmlns:am3d="http://schemas.microsoft.com/office/drawing/2017/model3d" xmlns:aink="http://schemas.microsoft.com/office/drawing/2016/ink" xmlns:cx8="http://schemas.microsoft.com/office/drawing/2016/5/14/chartex" xmlns:cx7="http://schemas.microsoft.com/office/drawing/2016/5/13/chartex" xmlns:cx6="http://schemas.microsoft.com/office/drawing/2016/5/12/chartex" xmlns:cx5="http://schemas.microsoft.com/office/drawing/2016/5/11/chartex" xmlns:cx4="http://schemas.microsoft.com/office/drawing/2016/5/10/chartex" xmlns:cx3="http://schemas.microsoft.com/office/drawing/2016/5/9/chartex" xmlns:cx2="http://schemas.microsoft.com/office/drawing/2015/10/21/chartex" xmlns:cx1="http://schemas.microsoft.com/office/drawing/2015/9/8/chartex" xmlns:cx="http://schemas.microsoft.com/office/drawing/2014/chartex" xmlns:wps="http://schemas.microsoft.com/office/word/2010/wordprocessingShape" xmlns:wne="http://schemas.microsoft.com/office/word/2006/wordml" xmlns:wpi="http://schemas.microsoft.com/office/word/2010/wordprocessingInk" xmlns:wpg="http://schemas.microsoft.com/office/word/2010/wordprocessingGroup" xmlns:w15="http://schemas.microsoft.com/office/word/2012/wordml" xmlns:w14="http://schemas.microsoft.com/office/word/2010/wordml" xmlns:wp="http://schemas.openxmlformats.org/drawingml/2006/wordprocessingDrawing" xmlns:wp14="http://schemas.microsoft.com/office/word/2010/wordprocessingDrawing" xmlns:m="http://schemas.openxmlformats.org/officeDocument/2006/math" xmlns:mc="http://schemas.openxmlformats.org/markup-compatibility/2006" xmlns:wpc="http://schemas.microsoft.com/office/word/2010/wordprocessingCanvas">
+                <a14:hiddenFill xmlns:wpc="http://schemas.microsoft.com/office/word/2010/wordprocessingCanvas" xmlns:mc="http://schemas.openxmlformats.org/markup-compatibility/2006" xmlns:m="http://schemas.openxmlformats.org/officeDocument/2006/math" xmlns:wp14="http://schemas.microsoft.com/office/word/2010/wordprocessingDrawing" xmlns:wp="http://schemas.openxmlformats.org/drawingml/2006/wordprocessingDrawing" xmlns:w14="http://schemas.microsoft.com/office/word/2010/wordml" xmlns:w15="http://schemas.microsoft.com/office/word/2012/wordml" xmlns:wpg="http://schemas.microsoft.com/office/word/2010/wordprocessingGroup" xmlns:wpi="http://schemas.microsoft.com/office/word/2010/wordprocessingInk" xmlns:wne="http://schemas.microsoft.com/office/word/2006/wordml" xmlns:wps="http://schemas.microsoft.com/office/word/2010/wordprocessingShape" xmlns:cx="http://schemas.microsoft.com/office/drawing/2014/chartex" xmlns:cx1="http://schemas.microsoft.com/office/drawing/2015/9/8/chartex" xmlns:cx2="http://schemas.microsoft.com/office/drawing/2015/10/21/chartex" xmlns:cx3="http://schemas.microsoft.com/office/drawing/2016/5/9/chartex" xmlns:cx4="http://schemas.microsoft.com/office/drawing/2016/5/10/chartex" xmlns:cx5="http://schemas.microsoft.com/office/drawing/2016/5/11/chartex" xmlns:cx6="http://schemas.microsoft.com/office/drawing/2016/5/12/chartex" xmlns:cx7="http://schemas.microsoft.com/office/drawing/2016/5/13/chartex" xmlns:cx8="http://schemas.microsoft.com/office/drawing/2016/5/14/chartex" xmlns:aink="http://schemas.microsoft.com/office/drawing/2016/ink" xmlns:am3d="http://schemas.microsoft.com/office/drawing/2017/model3d" xmlns:w16cid="http://schemas.microsoft.com/office/word/2016/wordml/cid" xmlns:w16se="http://schemas.microsoft.com/office/word/2015/wordml/symex" xmlns:a14="http://schemas.microsoft.com/office/drawing/2010/main" xmlns:w="http://schemas.openxmlformats.org/wordprocessingml/2006/main" xmlns:w10="urn:schemas-microsoft-com:office:word" xmlns:v="urn:schemas-microsoft-com:vml" xmlns:o="urn:schemas-microsoft-com:office:office" xmlns:mv="urn:schemas-microsoft-com:mac:vml" xmlns:mo="http://schemas.microsoft.com/office/mac/office/2008/main" xmlns="" xmlns:arto="http://schemas.microsoft.com/office/word/2006/arto" xmlns:lc="http://schemas.openxmlformats.org/drawingml/2006/lockedCanvas">
                   <a:noFill/>
                 </a14:hiddenFill>
               </a:ext>
@@ -3206,14 +3137,14 @@
             </a:ln>
             <a:extLst>
               <a:ext uri="{909E8E84-426E-40dd-AFC4-6F175D3DCCD1}">
-                <a14:hiddenFill xmlns:lc="http://schemas.openxmlformats.org/drawingml/2006/lockedCanvas" xmlns:arto="http://schemas.microsoft.com/office/word/2006/arto" xmlns="" xmlns:mo="http://schemas.microsoft.com/office/mac/office/2008/main" xmlns:mv="urn:schemas-microsoft-com:mac:vml" xmlns:o="urn:schemas-microsoft-com:office:office" xmlns:v="urn:schemas-microsoft-com:vml" xmlns:w10="urn:schemas-microsoft-com:office:word" xmlns:w="http://schemas.openxmlformats.org/wordprocessingml/2006/main" xmlns:a14="http://schemas.microsoft.com/office/drawing/2010/main" xmlns:w16se="http://schemas.microsoft.com/office/word/2015/wordml/symex" xmlns:w16cid="http://schemas.microsoft.com/office/word/2016/wordml/cid" xmlns:am3d="http://schemas.microsoft.com/office/drawing/2017/model3d" xmlns:aink="http://schemas.microsoft.com/office/drawing/2016/ink" xmlns:cx8="http://schemas.microsoft.com/office/drawing/2016/5/14/chartex" xmlns:cx7="http://schemas.microsoft.com/office/drawing/2016/5/13/chartex" xmlns:cx6="http://schemas.microsoft.com/office/drawing/2016/5/12/chartex" xmlns:cx5="http://schemas.microsoft.com/office/drawing/2016/5/11/chartex" xmlns:cx4="http://schemas.microsoft.com/office/drawing/2016/5/10/chartex" xmlns:cx3="http://schemas.microsoft.com/office/drawing/2016/5/9/chartex" xmlns:cx2="http://schemas.microsoft.com/office/drawing/2015/10/21/chartex" xmlns:cx1="http://schemas.microsoft.com/office/drawing/2015/9/8/chartex" xmlns:cx="http://schemas.microsoft.com/office/drawing/2014/chartex" xmlns:wps="http://schemas.microsoft.com/office/word/2010/wordprocessingShape" xmlns:wne="http://schemas.microsoft.com/office/word/2006/wordml" xmlns:wpi="http://schemas.microsoft.com/office/word/2010/wordprocessingInk" xmlns:wpg="http://schemas.microsoft.com/office/word/2010/wordprocessingGroup" xmlns:w15="http://schemas.microsoft.com/office/word/2012/wordml" xmlns:w14="http://schemas.microsoft.com/office/word/2010/wordml" xmlns:wp="http://schemas.openxmlformats.org/drawingml/2006/wordprocessingDrawing" xmlns:wp14="http://schemas.microsoft.com/office/word/2010/wordprocessingDrawing" xmlns:m="http://schemas.openxmlformats.org/officeDocument/2006/math" xmlns:mc="http://schemas.openxmlformats.org/markup-compatibility/2006" xmlns:wpc="http://schemas.microsoft.com/office/word/2010/wordprocessingCanvas">
+                <a14:hiddenFill xmlns:wpc="http://schemas.microsoft.com/office/word/2010/wordprocessingCanvas" xmlns:mc="http://schemas.openxmlformats.org/markup-compatibility/2006" xmlns:m="http://schemas.openxmlformats.org/officeDocument/2006/math" xmlns:wp14="http://schemas.microsoft.com/office/word/2010/wordprocessingDrawing" xmlns:wp="http://schemas.openxmlformats.org/drawingml/2006/wordprocessingDrawing" xmlns:w14="http://schemas.microsoft.com/office/word/2010/wordml" xmlns:w15="http://schemas.microsoft.com/office/word/2012/wordml" xmlns:wpg="http://schemas.microsoft.com/office/word/2010/wordprocessingGroup" xmlns:wpi="http://schemas.microsoft.com/office/word/2010/wordprocessingInk" xmlns:wne="http://schemas.microsoft.com/office/word/2006/wordml" xmlns:wps="http://schemas.microsoft.com/office/word/2010/wordprocessingShape" xmlns:cx="http://schemas.microsoft.com/office/drawing/2014/chartex" xmlns:cx1="http://schemas.microsoft.com/office/drawing/2015/9/8/chartex" xmlns:cx2="http://schemas.microsoft.com/office/drawing/2015/10/21/chartex" xmlns:cx3="http://schemas.microsoft.com/office/drawing/2016/5/9/chartex" xmlns:cx4="http://schemas.microsoft.com/office/drawing/2016/5/10/chartex" xmlns:cx5="http://schemas.microsoft.com/office/drawing/2016/5/11/chartex" xmlns:cx6="http://schemas.microsoft.com/office/drawing/2016/5/12/chartex" xmlns:cx7="http://schemas.microsoft.com/office/drawing/2016/5/13/chartex" xmlns:cx8="http://schemas.microsoft.com/office/drawing/2016/5/14/chartex" xmlns:aink="http://schemas.microsoft.com/office/drawing/2016/ink" xmlns:am3d="http://schemas.microsoft.com/office/drawing/2017/model3d" xmlns:w16cid="http://schemas.microsoft.com/office/word/2016/wordml/cid" xmlns:w16se="http://schemas.microsoft.com/office/word/2015/wordml/symex" xmlns:a14="http://schemas.microsoft.com/office/drawing/2010/main" xmlns:w="http://schemas.openxmlformats.org/wordprocessingml/2006/main" xmlns:w10="urn:schemas-microsoft-com:office:word" xmlns:v="urn:schemas-microsoft-com:vml" xmlns:o="urn:schemas-microsoft-com:office:office" xmlns:mv="urn:schemas-microsoft-com:mac:vml" xmlns:mo="http://schemas.microsoft.com/office/mac/office/2008/main" xmlns="" xmlns:arto="http://schemas.microsoft.com/office/word/2006/arto" xmlns:lc="http://schemas.openxmlformats.org/drawingml/2006/lockedCanvas">
                   <a:solidFill>
                     <a:srgbClr val="FFFFFF"/>
                   </a:solidFill>
                 </a14:hiddenFill>
               </a:ext>
               <a:ext uri="{91240B29-F687-4f45-9708-019B960494DF}">
-                <a14:hiddenLine xmlns:lc="http://schemas.openxmlformats.org/drawingml/2006/lockedCanvas" xmlns:arto="http://schemas.microsoft.com/office/word/2006/arto" xmlns="" xmlns:mo="http://schemas.microsoft.com/office/mac/office/2008/main" xmlns:mv="urn:schemas-microsoft-com:mac:vml" xmlns:o="urn:schemas-microsoft-com:office:office" xmlns:v="urn:schemas-microsoft-com:vml" xmlns:w10="urn:schemas-microsoft-com:office:word" xmlns:w="http://schemas.openxmlformats.org/wordprocessingml/2006/main" xmlns:a14="http://schemas.microsoft.com/office/drawing/2010/main" xmlns:w16se="http://schemas.microsoft.com/office/word/2015/wordml/symex" xmlns:w16cid="http://schemas.microsoft.com/office/word/2016/wordml/cid" xmlns:am3d="http://schemas.microsoft.com/office/drawing/2017/model3d" xmlns:aink="http://schemas.microsoft.com/office/drawing/2016/ink" xmlns:cx8="http://schemas.microsoft.com/office/drawing/2016/5/14/chartex" xmlns:cx7="http://schemas.microsoft.com/office/drawing/2016/5/13/chartex" xmlns:cx6="http://schemas.microsoft.com/office/drawing/2016/5/12/chartex" xmlns:cx5="http://schemas.microsoft.com/office/drawing/2016/5/11/chartex" xmlns:cx4="http://schemas.microsoft.com/office/drawing/2016/5/10/chartex" xmlns:cx3="http://schemas.microsoft.com/office/drawing/2016/5/9/chartex" xmlns:cx2="http://schemas.microsoft.com/office/drawing/2015/10/21/chartex" xmlns:cx1="http://schemas.microsoft.com/office/drawing/2015/9/8/chartex" xmlns:cx="http://schemas.microsoft.com/office/drawing/2014/chartex" xmlns:wps="http://schemas.microsoft.com/office/word/2010/wordprocessingShape" xmlns:wne="http://schemas.microsoft.com/office/word/2006/wordml" xmlns:wpi="http://schemas.microsoft.com/office/word/2010/wordprocessingInk" xmlns:wpg="http://schemas.microsoft.com/office/word/2010/wordprocessingGroup" xmlns:w15="http://schemas.microsoft.com/office/word/2012/wordml" xmlns:w14="http://schemas.microsoft.com/office/word/2010/wordml" xmlns:wp="http://schemas.openxmlformats.org/drawingml/2006/wordprocessingDrawing" xmlns:wp14="http://schemas.microsoft.com/office/word/2010/wordprocessingDrawing" xmlns:m="http://schemas.openxmlformats.org/officeDocument/2006/math" xmlns:mc="http://schemas.openxmlformats.org/markup-compatibility/2006" xmlns:wpc="http://schemas.microsoft.com/office/word/2010/wordprocessingCanvas" w="9525">
+                <a14:hiddenLine xmlns:wpc="http://schemas.microsoft.com/office/word/2010/wordprocessingCanvas" xmlns:mc="http://schemas.openxmlformats.org/markup-compatibility/2006" xmlns:m="http://schemas.openxmlformats.org/officeDocument/2006/math" xmlns:wp14="http://schemas.microsoft.com/office/word/2010/wordprocessingDrawing" xmlns:wp="http://schemas.openxmlformats.org/drawingml/2006/wordprocessingDrawing" xmlns:w14="http://schemas.microsoft.com/office/word/2010/wordml" xmlns:w15="http://schemas.microsoft.com/office/word/2012/wordml" xmlns:wpg="http://schemas.microsoft.com/office/word/2010/wordprocessingGroup" xmlns:wpi="http://schemas.microsoft.com/office/word/2010/wordprocessingInk" xmlns:wne="http://schemas.microsoft.com/office/word/2006/wordml" xmlns:wps="http://schemas.microsoft.com/office/word/2010/wordprocessingShape" xmlns:cx="http://schemas.microsoft.com/office/drawing/2014/chartex" xmlns:cx1="http://schemas.microsoft.com/office/drawing/2015/9/8/chartex" xmlns:cx2="http://schemas.microsoft.com/office/drawing/2015/10/21/chartex" xmlns:cx3="http://schemas.microsoft.com/office/drawing/2016/5/9/chartex" xmlns:cx4="http://schemas.microsoft.com/office/drawing/2016/5/10/chartex" xmlns:cx5="http://schemas.microsoft.com/office/drawing/2016/5/11/chartex" xmlns:cx6="http://schemas.microsoft.com/office/drawing/2016/5/12/chartex" xmlns:cx7="http://schemas.microsoft.com/office/drawing/2016/5/13/chartex" xmlns:cx8="http://schemas.microsoft.com/office/drawing/2016/5/14/chartex" xmlns:aink="http://schemas.microsoft.com/office/drawing/2016/ink" xmlns:am3d="http://schemas.microsoft.com/office/drawing/2017/model3d" xmlns:w16cid="http://schemas.microsoft.com/office/word/2016/wordml/cid" xmlns:w16se="http://schemas.microsoft.com/office/word/2015/wordml/symex" xmlns:a14="http://schemas.microsoft.com/office/drawing/2010/main" xmlns:w="http://schemas.openxmlformats.org/wordprocessingml/2006/main" xmlns:w10="urn:schemas-microsoft-com:office:word" xmlns:v="urn:schemas-microsoft-com:vml" xmlns:o="urn:schemas-microsoft-com:office:office" xmlns:mv="urn:schemas-microsoft-com:mac:vml" xmlns:mo="http://schemas.microsoft.com/office/mac/office/2008/main" xmlns="" xmlns:arto="http://schemas.microsoft.com/office/word/2006/arto" xmlns:lc="http://schemas.openxmlformats.org/drawingml/2006/lockedCanvas" w="9525">
                   <a:solidFill>
                     <a:srgbClr val="000000"/>
                   </a:solidFill>
@@ -3285,7 +3216,7 @@
             </a:ln>
             <a:extLst>
               <a:ext uri="{909E8E84-426E-40dd-AFC4-6F175D3DCCD1}">
-                <a14:hiddenFill xmlns:lc="http://schemas.openxmlformats.org/drawingml/2006/lockedCanvas" xmlns:arto="http://schemas.microsoft.com/office/word/2006/arto" xmlns="" xmlns:mo="http://schemas.microsoft.com/office/mac/office/2008/main" xmlns:mv="urn:schemas-microsoft-com:mac:vml" xmlns:o="urn:schemas-microsoft-com:office:office" xmlns:v="urn:schemas-microsoft-com:vml" xmlns:w10="urn:schemas-microsoft-com:office:word" xmlns:w="http://schemas.openxmlformats.org/wordprocessingml/2006/main" xmlns:a14="http://schemas.microsoft.com/office/drawing/2010/main" xmlns:w16se="http://schemas.microsoft.com/office/word/2015/wordml/symex" xmlns:w16cid="http://schemas.microsoft.com/office/word/2016/wordml/cid" xmlns:am3d="http://schemas.microsoft.com/office/drawing/2017/model3d" xmlns:aink="http://schemas.microsoft.com/office/drawing/2016/ink" xmlns:cx8="http://schemas.microsoft.com/office/drawing/2016/5/14/chartex" xmlns:cx7="http://schemas.microsoft.com/office/drawing/2016/5/13/chartex" xmlns:cx6="http://schemas.microsoft.com/office/drawing/2016/5/12/chartex" xmlns:cx5="http://schemas.microsoft.com/office/drawing/2016/5/11/chartex" xmlns:cx4="http://schemas.microsoft.com/office/drawing/2016/5/10/chartex" xmlns:cx3="http://schemas.microsoft.com/office/drawing/2016/5/9/chartex" xmlns:cx2="http://schemas.microsoft.com/office/drawing/2015/10/21/chartex" xmlns:cx1="http://schemas.microsoft.com/office/drawing/2015/9/8/chartex" xmlns:cx="http://schemas.microsoft.com/office/drawing/2014/chartex" xmlns:wps="http://schemas.microsoft.com/office/word/2010/wordprocessingShape" xmlns:wne="http://schemas.microsoft.com/office/word/2006/wordml" xmlns:wpi="http://schemas.microsoft.com/office/word/2010/wordprocessingInk" xmlns:wpg="http://schemas.microsoft.com/office/word/2010/wordprocessingGroup" xmlns:w15="http://schemas.microsoft.com/office/word/2012/wordml" xmlns:w14="http://schemas.microsoft.com/office/word/2010/wordml" xmlns:wp="http://schemas.openxmlformats.org/drawingml/2006/wordprocessingDrawing" xmlns:wp14="http://schemas.microsoft.com/office/word/2010/wordprocessingDrawing" xmlns:m="http://schemas.openxmlformats.org/officeDocument/2006/math" xmlns:mc="http://schemas.openxmlformats.org/markup-compatibility/2006" xmlns:wpc="http://schemas.microsoft.com/office/word/2010/wordprocessingCanvas">
+                <a14:hiddenFill xmlns:wpc="http://schemas.microsoft.com/office/word/2010/wordprocessingCanvas" xmlns:mc="http://schemas.openxmlformats.org/markup-compatibility/2006" xmlns:m="http://schemas.openxmlformats.org/officeDocument/2006/math" xmlns:wp14="http://schemas.microsoft.com/office/word/2010/wordprocessingDrawing" xmlns:wp="http://schemas.openxmlformats.org/drawingml/2006/wordprocessingDrawing" xmlns:w14="http://schemas.microsoft.com/office/word/2010/wordml" xmlns:w15="http://schemas.microsoft.com/office/word/2012/wordml" xmlns:wpg="http://schemas.microsoft.com/office/word/2010/wordprocessingGroup" xmlns:wpi="http://schemas.microsoft.com/office/word/2010/wordprocessingInk" xmlns:wne="http://schemas.microsoft.com/office/word/2006/wordml" xmlns:wps="http://schemas.microsoft.com/office/word/2010/wordprocessingShape" xmlns:cx="http://schemas.microsoft.com/office/drawing/2014/chartex" xmlns:cx1="http://schemas.microsoft.com/office/drawing/2015/9/8/chartex" xmlns:cx2="http://schemas.microsoft.com/office/drawing/2015/10/21/chartex" xmlns:cx3="http://schemas.microsoft.com/office/drawing/2016/5/9/chartex" xmlns:cx4="http://schemas.microsoft.com/office/drawing/2016/5/10/chartex" xmlns:cx5="http://schemas.microsoft.com/office/drawing/2016/5/11/chartex" xmlns:cx6="http://schemas.microsoft.com/office/drawing/2016/5/12/chartex" xmlns:cx7="http://schemas.microsoft.com/office/drawing/2016/5/13/chartex" xmlns:cx8="http://schemas.microsoft.com/office/drawing/2016/5/14/chartex" xmlns:aink="http://schemas.microsoft.com/office/drawing/2016/ink" xmlns:am3d="http://schemas.microsoft.com/office/drawing/2017/model3d" xmlns:w16cid="http://schemas.microsoft.com/office/word/2016/wordml/cid" xmlns:w16se="http://schemas.microsoft.com/office/word/2015/wordml/symex" xmlns:a14="http://schemas.microsoft.com/office/drawing/2010/main" xmlns:w="http://schemas.openxmlformats.org/wordprocessingml/2006/main" xmlns:w10="urn:schemas-microsoft-com:office:word" xmlns:v="urn:schemas-microsoft-com:vml" xmlns:o="urn:schemas-microsoft-com:office:office" xmlns:mv="urn:schemas-microsoft-com:mac:vml" xmlns:mo="http://schemas.microsoft.com/office/mac/office/2008/main" xmlns="" xmlns:arto="http://schemas.microsoft.com/office/word/2006/arto" xmlns:lc="http://schemas.openxmlformats.org/drawingml/2006/lockedCanvas">
                   <a:solidFill>
                     <a:srgbClr val="FFFFFF"/>
                   </a:solidFill>
@@ -3374,7 +3305,7 @@
             </a:ln>
             <a:extLst>
               <a:ext uri="{909E8E84-426E-40dd-AFC4-6F175D3DCCD1}">
-                <a14:hiddenFill xmlns:lc="http://schemas.openxmlformats.org/drawingml/2006/lockedCanvas" xmlns:arto="http://schemas.microsoft.com/office/word/2006/arto" xmlns="" xmlns:mo="http://schemas.microsoft.com/office/mac/office/2008/main" xmlns:mv="urn:schemas-microsoft-com:mac:vml" xmlns:o="urn:schemas-microsoft-com:office:office" xmlns:v="urn:schemas-microsoft-com:vml" xmlns:w10="urn:schemas-microsoft-com:office:word" xmlns:w="http://schemas.openxmlformats.org/wordprocessingml/2006/main" xmlns:a14="http://schemas.microsoft.com/office/drawing/2010/main" xmlns:w16se="http://schemas.microsoft.com/office/word/2015/wordml/symex" xmlns:w16cid="http://schemas.microsoft.com/office/word/2016/wordml/cid" xmlns:am3d="http://schemas.microsoft.com/office/drawing/2017/model3d" xmlns:aink="http://schemas.microsoft.com/office/drawing/2016/ink" xmlns:cx8="http://schemas.microsoft.com/office/drawing/2016/5/14/chartex" xmlns:cx7="http://schemas.microsoft.com/office/drawing/2016/5/13/chartex" xmlns:cx6="http://schemas.microsoft.com/office/drawing/2016/5/12/chartex" xmlns:cx5="http://schemas.microsoft.com/office/drawing/2016/5/11/chartex" xmlns:cx4="http://schemas.microsoft.com/office/drawing/2016/5/10/chartex" xmlns:cx3="http://schemas.microsoft.com/office/drawing/2016/5/9/chartex" xmlns:cx2="http://schemas.microsoft.com/office/drawing/2015/10/21/chartex" xmlns:cx1="http://schemas.microsoft.com/office/drawing/2015/9/8/chartex" xmlns:cx="http://schemas.microsoft.com/office/drawing/2014/chartex" xmlns:wps="http://schemas.microsoft.com/office/word/2010/wordprocessingShape" xmlns:wne="http://schemas.microsoft.com/office/word/2006/wordml" xmlns:wpi="http://schemas.microsoft.com/office/word/2010/wordprocessingInk" xmlns:wpg="http://schemas.microsoft.com/office/word/2010/wordprocessingGroup" xmlns:w15="http://schemas.microsoft.com/office/word/2012/wordml" xmlns:w14="http://schemas.microsoft.com/office/word/2010/wordml" xmlns:wp="http://schemas.openxmlformats.org/drawingml/2006/wordprocessingDrawing" xmlns:wp14="http://schemas.microsoft.com/office/word/2010/wordprocessingDrawing" xmlns:m="http://schemas.openxmlformats.org/officeDocument/2006/math" xmlns:mc="http://schemas.openxmlformats.org/markup-compatibility/2006" xmlns:wpc="http://schemas.microsoft.com/office/word/2010/wordprocessingCanvas">
+                <a14:hiddenFill xmlns:wpc="http://schemas.microsoft.com/office/word/2010/wordprocessingCanvas" xmlns:mc="http://schemas.openxmlformats.org/markup-compatibility/2006" xmlns:m="http://schemas.openxmlformats.org/officeDocument/2006/math" xmlns:wp14="http://schemas.microsoft.com/office/word/2010/wordprocessingDrawing" xmlns:wp="http://schemas.openxmlformats.org/drawingml/2006/wordprocessingDrawing" xmlns:w14="http://schemas.microsoft.com/office/word/2010/wordml" xmlns:w15="http://schemas.microsoft.com/office/word/2012/wordml" xmlns:wpg="http://schemas.microsoft.com/office/word/2010/wordprocessingGroup" xmlns:wpi="http://schemas.microsoft.com/office/word/2010/wordprocessingInk" xmlns:wne="http://schemas.microsoft.com/office/word/2006/wordml" xmlns:wps="http://schemas.microsoft.com/office/word/2010/wordprocessingShape" xmlns:cx="http://schemas.microsoft.com/office/drawing/2014/chartex" xmlns:cx1="http://schemas.microsoft.com/office/drawing/2015/9/8/chartex" xmlns:cx2="http://schemas.microsoft.com/office/drawing/2015/10/21/chartex" xmlns:cx3="http://schemas.microsoft.com/office/drawing/2016/5/9/chartex" xmlns:cx4="http://schemas.microsoft.com/office/drawing/2016/5/10/chartex" xmlns:cx5="http://schemas.microsoft.com/office/drawing/2016/5/11/chartex" xmlns:cx6="http://schemas.microsoft.com/office/drawing/2016/5/12/chartex" xmlns:cx7="http://schemas.microsoft.com/office/drawing/2016/5/13/chartex" xmlns:cx8="http://schemas.microsoft.com/office/drawing/2016/5/14/chartex" xmlns:aink="http://schemas.microsoft.com/office/drawing/2016/ink" xmlns:am3d="http://schemas.microsoft.com/office/drawing/2017/model3d" xmlns:w16cid="http://schemas.microsoft.com/office/word/2016/wordml/cid" xmlns:w16se="http://schemas.microsoft.com/office/word/2015/wordml/symex" xmlns:a14="http://schemas.microsoft.com/office/drawing/2010/main" xmlns:w="http://schemas.openxmlformats.org/wordprocessingml/2006/main" xmlns:w10="urn:schemas-microsoft-com:office:word" xmlns:v="urn:schemas-microsoft-com:vml" xmlns:o="urn:schemas-microsoft-com:office:office" xmlns:mv="urn:schemas-microsoft-com:mac:vml" xmlns:mo="http://schemas.microsoft.com/office/mac/office/2008/main" xmlns="" xmlns:arto="http://schemas.microsoft.com/office/word/2006/arto" xmlns:lc="http://schemas.openxmlformats.org/drawingml/2006/lockedCanvas">
                   <a:solidFill>
                     <a:srgbClr val="FFFFFF"/>
                   </a:solidFill>
@@ -3444,14 +3375,14 @@
             </a:ln>
             <a:extLst>
               <a:ext uri="{909E8E84-426E-40dd-AFC4-6F175D3DCCD1}">
-                <a14:hiddenFill xmlns:lc="http://schemas.openxmlformats.org/drawingml/2006/lockedCanvas" xmlns:arto="http://schemas.microsoft.com/office/word/2006/arto" xmlns="" xmlns:mo="http://schemas.microsoft.com/office/mac/office/2008/main" xmlns:mv="urn:schemas-microsoft-com:mac:vml" xmlns:o="urn:schemas-microsoft-com:office:office" xmlns:v="urn:schemas-microsoft-com:vml" xmlns:w10="urn:schemas-microsoft-com:office:word" xmlns:w="http://schemas.openxmlformats.org/wordprocessingml/2006/main" xmlns:a14="http://schemas.microsoft.com/office/drawing/2010/main" xmlns:w16se="http://schemas.microsoft.com/office/word/2015/wordml/symex" xmlns:w16cid="http://schemas.microsoft.com/office/word/2016/wordml/cid" xmlns:am3d="http://schemas.microsoft.com/office/drawing/2017/model3d" xmlns:aink="http://schemas.microsoft.com/office/drawing/2016/ink" xmlns:cx8="http://schemas.microsoft.com/office/drawing/2016/5/14/chartex" xmlns:cx7="http://schemas.microsoft.com/office/drawing/2016/5/13/chartex" xmlns:cx6="http://schemas.microsoft.com/office/drawing/2016/5/12/chartex" xmlns:cx5="http://schemas.microsoft.com/office/drawing/2016/5/11/chartex" xmlns:cx4="http://schemas.microsoft.com/office/drawing/2016/5/10/chartex" xmlns:cx3="http://schemas.microsoft.com/office/drawing/2016/5/9/chartex" xmlns:cx2="http://schemas.microsoft.com/office/drawing/2015/10/21/chartex" xmlns:cx1="http://schemas.microsoft.com/office/drawing/2015/9/8/chartex" xmlns:cx="http://schemas.microsoft.com/office/drawing/2014/chartex" xmlns:wps="http://schemas.microsoft.com/office/word/2010/wordprocessingShape" xmlns:wne="http://schemas.microsoft.com/office/word/2006/wordml" xmlns:wpi="http://schemas.microsoft.com/office/word/2010/wordprocessingInk" xmlns:wpg="http://schemas.microsoft.com/office/word/2010/wordprocessingGroup" xmlns:w15="http://schemas.microsoft.com/office/word/2012/wordml" xmlns:w14="http://schemas.microsoft.com/office/word/2010/wordml" xmlns:wp="http://schemas.openxmlformats.org/drawingml/2006/wordprocessingDrawing" xmlns:wp14="http://schemas.microsoft.com/office/word/2010/wordprocessingDrawing" xmlns:m="http://schemas.openxmlformats.org/officeDocument/2006/math" xmlns:mc="http://schemas.openxmlformats.org/markup-compatibility/2006" xmlns:wpc="http://schemas.microsoft.com/office/word/2010/wordprocessingCanvas">
+                <a14:hiddenFill xmlns:wpc="http://schemas.microsoft.com/office/word/2010/wordprocessingCanvas" xmlns:mc="http://schemas.openxmlformats.org/markup-compatibility/2006" xmlns:m="http://schemas.openxmlformats.org/officeDocument/2006/math" xmlns:wp14="http://schemas.microsoft.com/office/word/2010/wordprocessingDrawing" xmlns:wp="http://schemas.openxmlformats.org/drawingml/2006/wordprocessingDrawing" xmlns:w14="http://schemas.microsoft.com/office/word/2010/wordml" xmlns:w15="http://schemas.microsoft.com/office/word/2012/wordml" xmlns:wpg="http://schemas.microsoft.com/office/word/2010/wordprocessingGroup" xmlns:wpi="http://schemas.microsoft.com/office/word/2010/wordprocessingInk" xmlns:wne="http://schemas.microsoft.com/office/word/2006/wordml" xmlns:wps="http://schemas.microsoft.com/office/word/2010/wordprocessingShape" xmlns:cx="http://schemas.microsoft.com/office/drawing/2014/chartex" xmlns:cx1="http://schemas.microsoft.com/office/drawing/2015/9/8/chartex" xmlns:cx2="http://schemas.microsoft.com/office/drawing/2015/10/21/chartex" xmlns:cx3="http://schemas.microsoft.com/office/drawing/2016/5/9/chartex" xmlns:cx4="http://schemas.microsoft.com/office/drawing/2016/5/10/chartex" xmlns:cx5="http://schemas.microsoft.com/office/drawing/2016/5/11/chartex" xmlns:cx6="http://schemas.microsoft.com/office/drawing/2016/5/12/chartex" xmlns:cx7="http://schemas.microsoft.com/office/drawing/2016/5/13/chartex" xmlns:cx8="http://schemas.microsoft.com/office/drawing/2016/5/14/chartex" xmlns:aink="http://schemas.microsoft.com/office/drawing/2016/ink" xmlns:am3d="http://schemas.microsoft.com/office/drawing/2017/model3d" xmlns:w16cid="http://schemas.microsoft.com/office/word/2016/wordml/cid" xmlns:w16se="http://schemas.microsoft.com/office/word/2015/wordml/symex" xmlns:a14="http://schemas.microsoft.com/office/drawing/2010/main" xmlns:w="http://schemas.openxmlformats.org/wordprocessingml/2006/main" xmlns:w10="urn:schemas-microsoft-com:office:word" xmlns:v="urn:schemas-microsoft-com:vml" xmlns:o="urn:schemas-microsoft-com:office:office" xmlns:mv="urn:schemas-microsoft-com:mac:vml" xmlns:mo="http://schemas.microsoft.com/office/mac/office/2008/main" xmlns="" xmlns:arto="http://schemas.microsoft.com/office/word/2006/arto" xmlns:lc="http://schemas.openxmlformats.org/drawingml/2006/lockedCanvas">
                   <a:solidFill>
                     <a:srgbClr val="FFFFFF"/>
                   </a:solidFill>
                 </a14:hiddenFill>
               </a:ext>
               <a:ext uri="{91240B29-F687-4f45-9708-019B960494DF}">
-                <a14:hiddenLine xmlns:lc="http://schemas.openxmlformats.org/drawingml/2006/lockedCanvas" xmlns:arto="http://schemas.microsoft.com/office/word/2006/arto" xmlns="" xmlns:mo="http://schemas.microsoft.com/office/mac/office/2008/main" xmlns:mv="urn:schemas-microsoft-com:mac:vml" xmlns:o="urn:schemas-microsoft-com:office:office" xmlns:v="urn:schemas-microsoft-com:vml" xmlns:w10="urn:schemas-microsoft-com:office:word" xmlns:w="http://schemas.openxmlformats.org/wordprocessingml/2006/main" xmlns:a14="http://schemas.microsoft.com/office/drawing/2010/main" xmlns:w16se="http://schemas.microsoft.com/office/word/2015/wordml/symex" xmlns:w16cid="http://schemas.microsoft.com/office/word/2016/wordml/cid" xmlns:am3d="http://schemas.microsoft.com/office/drawing/2017/model3d" xmlns:aink="http://schemas.microsoft.com/office/drawing/2016/ink" xmlns:cx8="http://schemas.microsoft.com/office/drawing/2016/5/14/chartex" xmlns:cx7="http://schemas.microsoft.com/office/drawing/2016/5/13/chartex" xmlns:cx6="http://schemas.microsoft.com/office/drawing/2016/5/12/chartex" xmlns:cx5="http://schemas.microsoft.com/office/drawing/2016/5/11/chartex" xmlns:cx4="http://schemas.microsoft.com/office/drawing/2016/5/10/chartex" xmlns:cx3="http://schemas.microsoft.com/office/drawing/2016/5/9/chartex" xmlns:cx2="http://schemas.microsoft.com/office/drawing/2015/10/21/chartex" xmlns:cx1="http://schemas.microsoft.com/office/drawing/2015/9/8/chartex" xmlns:cx="http://schemas.microsoft.com/office/drawing/2014/chartex" xmlns:wps="http://schemas.microsoft.com/office/word/2010/wordprocessingShape" xmlns:wne="http://schemas.microsoft.com/office/word/2006/wordml" xmlns:wpi="http://schemas.microsoft.com/office/word/2010/wordprocessingInk" xmlns:wpg="http://schemas.microsoft.com/office/word/2010/wordprocessingGroup" xmlns:w15="http://schemas.microsoft.com/office/word/2012/wordml" xmlns:w14="http://schemas.microsoft.com/office/word/2010/wordml" xmlns:wp="http://schemas.openxmlformats.org/drawingml/2006/wordprocessingDrawing" xmlns:wp14="http://schemas.microsoft.com/office/word/2010/wordprocessingDrawing" xmlns:m="http://schemas.openxmlformats.org/officeDocument/2006/math" xmlns:mc="http://schemas.openxmlformats.org/markup-compatibility/2006" xmlns:wpc="http://schemas.microsoft.com/office/word/2010/wordprocessingCanvas" w="9525">
+                <a14:hiddenLine xmlns:wpc="http://schemas.microsoft.com/office/word/2010/wordprocessingCanvas" xmlns:mc="http://schemas.openxmlformats.org/markup-compatibility/2006" xmlns:m="http://schemas.openxmlformats.org/officeDocument/2006/math" xmlns:wp14="http://schemas.microsoft.com/office/word/2010/wordprocessingDrawing" xmlns:wp="http://schemas.openxmlformats.org/drawingml/2006/wordprocessingDrawing" xmlns:w14="http://schemas.microsoft.com/office/word/2010/wordml" xmlns:w15="http://schemas.microsoft.com/office/word/2012/wordml" xmlns:wpg="http://schemas.microsoft.com/office/word/2010/wordprocessingGroup" xmlns:wpi="http://schemas.microsoft.com/office/word/2010/wordprocessingInk" xmlns:wne="http://schemas.microsoft.com/office/word/2006/wordml" xmlns:wps="http://schemas.microsoft.com/office/word/2010/wordprocessingShape" xmlns:cx="http://schemas.microsoft.com/office/drawing/2014/chartex" xmlns:cx1="http://schemas.microsoft.com/office/drawing/2015/9/8/chartex" xmlns:cx2="http://schemas.microsoft.com/office/drawing/2015/10/21/chartex" xmlns:cx3="http://schemas.microsoft.com/office/drawing/2016/5/9/chartex" xmlns:cx4="http://schemas.microsoft.com/office/drawing/2016/5/10/chartex" xmlns:cx5="http://schemas.microsoft.com/office/drawing/2016/5/11/chartex" xmlns:cx6="http://schemas.microsoft.com/office/drawing/2016/5/12/chartex" xmlns:cx7="http://schemas.microsoft.com/office/drawing/2016/5/13/chartex" xmlns:cx8="http://schemas.microsoft.com/office/drawing/2016/5/14/chartex" xmlns:aink="http://schemas.microsoft.com/office/drawing/2016/ink" xmlns:am3d="http://schemas.microsoft.com/office/drawing/2017/model3d" xmlns:w16cid="http://schemas.microsoft.com/office/word/2016/wordml/cid" xmlns:w16se="http://schemas.microsoft.com/office/word/2015/wordml/symex" xmlns:a14="http://schemas.microsoft.com/office/drawing/2010/main" xmlns:w="http://schemas.openxmlformats.org/wordprocessingml/2006/main" xmlns:w10="urn:schemas-microsoft-com:office:word" xmlns:v="urn:schemas-microsoft-com:vml" xmlns:o="urn:schemas-microsoft-com:office:office" xmlns:mv="urn:schemas-microsoft-com:mac:vml" xmlns:mo="http://schemas.microsoft.com/office/mac/office/2008/main" xmlns="" xmlns:arto="http://schemas.microsoft.com/office/word/2006/arto" xmlns:lc="http://schemas.openxmlformats.org/drawingml/2006/lockedCanvas" w="9525">
                   <a:solidFill>
                     <a:srgbClr val="000000"/>
                   </a:solidFill>
@@ -3556,7 +3487,7 @@
             </a:ln>
             <a:extLst>
               <a:ext uri="{909E8E84-426E-40dd-AFC4-6F175D3DCCD1}">
-                <a14:hiddenFill xmlns:lc="http://schemas.openxmlformats.org/drawingml/2006/lockedCanvas" xmlns:arto="http://schemas.microsoft.com/office/word/2006/arto" xmlns="" xmlns:mo="http://schemas.microsoft.com/office/mac/office/2008/main" xmlns:mv="urn:schemas-microsoft-com:mac:vml" xmlns:o="urn:schemas-microsoft-com:office:office" xmlns:v="urn:schemas-microsoft-com:vml" xmlns:w10="urn:schemas-microsoft-com:office:word" xmlns:w="http://schemas.openxmlformats.org/wordprocessingml/2006/main" xmlns:a14="http://schemas.microsoft.com/office/drawing/2010/main" xmlns:w16se="http://schemas.microsoft.com/office/word/2015/wordml/symex" xmlns:w16cid="http://schemas.microsoft.com/office/word/2016/wordml/cid" xmlns:am3d="http://schemas.microsoft.com/office/drawing/2017/model3d" xmlns:aink="http://schemas.microsoft.com/office/drawing/2016/ink" xmlns:cx8="http://schemas.microsoft.com/office/drawing/2016/5/14/chartex" xmlns:cx7="http://schemas.microsoft.com/office/drawing/2016/5/13/chartex" xmlns:cx6="http://schemas.microsoft.com/office/drawing/2016/5/12/chartex" xmlns:cx5="http://schemas.microsoft.com/office/drawing/2016/5/11/chartex" xmlns:cx4="http://schemas.microsoft.com/office/drawing/2016/5/10/chartex" xmlns:cx3="http://schemas.microsoft.com/office/drawing/2016/5/9/chartex" xmlns:cx2="http://schemas.microsoft.com/office/drawing/2015/10/21/chartex" xmlns:cx1="http://schemas.microsoft.com/office/drawing/2015/9/8/chartex" xmlns:cx="http://schemas.microsoft.com/office/drawing/2014/chartex" xmlns:wps="http://schemas.microsoft.com/office/word/2010/wordprocessingShape" xmlns:wne="http://schemas.microsoft.com/office/word/2006/wordml" xmlns:wpi="http://schemas.microsoft.com/office/word/2010/wordprocessingInk" xmlns:wpg="http://schemas.microsoft.com/office/word/2010/wordprocessingGroup" xmlns:w15="http://schemas.microsoft.com/office/word/2012/wordml" xmlns:w14="http://schemas.microsoft.com/office/word/2010/wordml" xmlns:wp="http://schemas.openxmlformats.org/drawingml/2006/wordprocessingDrawing" xmlns:wp14="http://schemas.microsoft.com/office/word/2010/wordprocessingDrawing" xmlns:m="http://schemas.openxmlformats.org/officeDocument/2006/math" xmlns:mc="http://schemas.openxmlformats.org/markup-compatibility/2006" xmlns:wpc="http://schemas.microsoft.com/office/word/2010/wordprocessingCanvas">
+                <a14:hiddenFill xmlns:wpc="http://schemas.microsoft.com/office/word/2010/wordprocessingCanvas" xmlns:mc="http://schemas.openxmlformats.org/markup-compatibility/2006" xmlns:m="http://schemas.openxmlformats.org/officeDocument/2006/math" xmlns:wp14="http://schemas.microsoft.com/office/word/2010/wordprocessingDrawing" xmlns:wp="http://schemas.openxmlformats.org/drawingml/2006/wordprocessingDrawing" xmlns:w14="http://schemas.microsoft.com/office/word/2010/wordml" xmlns:w15="http://schemas.microsoft.com/office/word/2012/wordml" xmlns:wpg="http://schemas.microsoft.com/office/word/2010/wordprocessingGroup" xmlns:wpi="http://schemas.microsoft.com/office/word/2010/wordprocessingInk" xmlns:wne="http://schemas.microsoft.com/office/word/2006/wordml" xmlns:wps="http://schemas.microsoft.com/office/word/2010/wordprocessingShape" xmlns:cx="http://schemas.microsoft.com/office/drawing/2014/chartex" xmlns:cx1="http://schemas.microsoft.com/office/drawing/2015/9/8/chartex" xmlns:cx2="http://schemas.microsoft.com/office/drawing/2015/10/21/chartex" xmlns:cx3="http://schemas.microsoft.com/office/drawing/2016/5/9/chartex" xmlns:cx4="http://schemas.microsoft.com/office/drawing/2016/5/10/chartex" xmlns:cx5="http://schemas.microsoft.com/office/drawing/2016/5/11/chartex" xmlns:cx6="http://schemas.microsoft.com/office/drawing/2016/5/12/chartex" xmlns:cx7="http://schemas.microsoft.com/office/drawing/2016/5/13/chartex" xmlns:cx8="http://schemas.microsoft.com/office/drawing/2016/5/14/chartex" xmlns:aink="http://schemas.microsoft.com/office/drawing/2016/ink" xmlns:am3d="http://schemas.microsoft.com/office/drawing/2017/model3d" xmlns:w16cid="http://schemas.microsoft.com/office/word/2016/wordml/cid" xmlns:w16se="http://schemas.microsoft.com/office/word/2015/wordml/symex" xmlns:a14="http://schemas.microsoft.com/office/drawing/2010/main" xmlns:w="http://schemas.openxmlformats.org/wordprocessingml/2006/main" xmlns:w10="urn:schemas-microsoft-com:office:word" xmlns:v="urn:schemas-microsoft-com:vml" xmlns:o="urn:schemas-microsoft-com:office:office" xmlns:mv="urn:schemas-microsoft-com:mac:vml" xmlns:mo="http://schemas.microsoft.com/office/mac/office/2008/main" xmlns="" xmlns:arto="http://schemas.microsoft.com/office/word/2006/arto" xmlns:lc="http://schemas.openxmlformats.org/drawingml/2006/lockedCanvas">
                   <a:noFill/>
                 </a14:hiddenFill>
               </a:ext>
@@ -3597,7 +3528,7 @@
             </a:ln>
             <a:extLst>
               <a:ext uri="{909E8E84-426E-40dd-AFC4-6F175D3DCCD1}">
-                <a14:hiddenFill xmlns:lc="http://schemas.openxmlformats.org/drawingml/2006/lockedCanvas" xmlns:arto="http://schemas.microsoft.com/office/word/2006/arto" xmlns="" xmlns:mo="http://schemas.microsoft.com/office/mac/office/2008/main" xmlns:mv="urn:schemas-microsoft-com:mac:vml" xmlns:o="urn:schemas-microsoft-com:office:office" xmlns:v="urn:schemas-microsoft-com:vml" xmlns:w10="urn:schemas-microsoft-com:office:word" xmlns:w="http://schemas.openxmlformats.org/wordprocessingml/2006/main" xmlns:a14="http://schemas.microsoft.com/office/drawing/2010/main" xmlns:w16se="http://schemas.microsoft.com/office/word/2015/wordml/symex" xmlns:w16cid="http://schemas.microsoft.com/office/word/2016/wordml/cid" xmlns:am3d="http://schemas.microsoft.com/office/drawing/2017/model3d" xmlns:aink="http://schemas.microsoft.com/office/drawing/2016/ink" xmlns:cx8="http://schemas.microsoft.com/office/drawing/2016/5/14/chartex" xmlns:cx7="http://schemas.microsoft.com/office/drawing/2016/5/13/chartex" xmlns:cx6="http://schemas.microsoft.com/office/drawing/2016/5/12/chartex" xmlns:cx5="http://schemas.microsoft.com/office/drawing/2016/5/11/chartex" xmlns:cx4="http://schemas.microsoft.com/office/drawing/2016/5/10/chartex" xmlns:cx3="http://schemas.microsoft.com/office/drawing/2016/5/9/chartex" xmlns:cx2="http://schemas.microsoft.com/office/drawing/2015/10/21/chartex" xmlns:cx1="http://schemas.microsoft.com/office/drawing/2015/9/8/chartex" xmlns:cx="http://schemas.microsoft.com/office/drawing/2014/chartex" xmlns:wps="http://schemas.microsoft.com/office/word/2010/wordprocessingShape" xmlns:wne="http://schemas.microsoft.com/office/word/2006/wordml" xmlns:wpi="http://schemas.microsoft.com/office/word/2010/wordprocessingInk" xmlns:wpg="http://schemas.microsoft.com/office/word/2010/wordprocessingGroup" xmlns:w15="http://schemas.microsoft.com/office/word/2012/wordml" xmlns:w14="http://schemas.microsoft.com/office/word/2010/wordml" xmlns:wp="http://schemas.openxmlformats.org/drawingml/2006/wordprocessingDrawing" xmlns:wp14="http://schemas.microsoft.com/office/word/2010/wordprocessingDrawing" xmlns:m="http://schemas.openxmlformats.org/officeDocument/2006/math" xmlns:mc="http://schemas.openxmlformats.org/markup-compatibility/2006" xmlns:wpc="http://schemas.microsoft.com/office/word/2010/wordprocessingCanvas">
+                <a14:hiddenFill xmlns:wpc="http://schemas.microsoft.com/office/word/2010/wordprocessingCanvas" xmlns:mc="http://schemas.openxmlformats.org/markup-compatibility/2006" xmlns:m="http://schemas.openxmlformats.org/officeDocument/2006/math" xmlns:wp14="http://schemas.microsoft.com/office/word/2010/wordprocessingDrawing" xmlns:wp="http://schemas.openxmlformats.org/drawingml/2006/wordprocessingDrawing" xmlns:w14="http://schemas.microsoft.com/office/word/2010/wordml" xmlns:w15="http://schemas.microsoft.com/office/word/2012/wordml" xmlns:wpg="http://schemas.microsoft.com/office/word/2010/wordprocessingGroup" xmlns:wpi="http://schemas.microsoft.com/office/word/2010/wordprocessingInk" xmlns:wne="http://schemas.microsoft.com/office/word/2006/wordml" xmlns:wps="http://schemas.microsoft.com/office/word/2010/wordprocessingShape" xmlns:cx="http://schemas.microsoft.com/office/drawing/2014/chartex" xmlns:cx1="http://schemas.microsoft.com/office/drawing/2015/9/8/chartex" xmlns:cx2="http://schemas.microsoft.com/office/drawing/2015/10/21/chartex" xmlns:cx3="http://schemas.microsoft.com/office/drawing/2016/5/9/chartex" xmlns:cx4="http://schemas.microsoft.com/office/drawing/2016/5/10/chartex" xmlns:cx5="http://schemas.microsoft.com/office/drawing/2016/5/11/chartex" xmlns:cx6="http://schemas.microsoft.com/office/drawing/2016/5/12/chartex" xmlns:cx7="http://schemas.microsoft.com/office/drawing/2016/5/13/chartex" xmlns:cx8="http://schemas.microsoft.com/office/drawing/2016/5/14/chartex" xmlns:aink="http://schemas.microsoft.com/office/drawing/2016/ink" xmlns:am3d="http://schemas.microsoft.com/office/drawing/2017/model3d" xmlns:w16cid="http://schemas.microsoft.com/office/word/2016/wordml/cid" xmlns:w16se="http://schemas.microsoft.com/office/word/2015/wordml/symex" xmlns:a14="http://schemas.microsoft.com/office/drawing/2010/main" xmlns:w="http://schemas.openxmlformats.org/wordprocessingml/2006/main" xmlns:w10="urn:schemas-microsoft-com:office:word" xmlns:v="urn:schemas-microsoft-com:vml" xmlns:o="urn:schemas-microsoft-com:office:office" xmlns:mv="urn:schemas-microsoft-com:mac:vml" xmlns:mo="http://schemas.microsoft.com/office/mac/office/2008/main" xmlns="" xmlns:arto="http://schemas.microsoft.com/office/word/2006/arto" xmlns:lc="http://schemas.openxmlformats.org/drawingml/2006/lockedCanvas">
                   <a:solidFill>
                     <a:srgbClr val="FFFFFF"/>
                   </a:solidFill>
@@ -3673,7 +3604,7 @@
             </a:ln>
             <a:extLst>
               <a:ext uri="{909E8E84-426E-40dd-AFC4-6F175D3DCCD1}">
-                <a14:hiddenFill xmlns:lc="http://schemas.openxmlformats.org/drawingml/2006/lockedCanvas" xmlns:arto="http://schemas.microsoft.com/office/word/2006/arto" xmlns="" xmlns:mo="http://schemas.microsoft.com/office/mac/office/2008/main" xmlns:mv="urn:schemas-microsoft-com:mac:vml" xmlns:o="urn:schemas-microsoft-com:office:office" xmlns:v="urn:schemas-microsoft-com:vml" xmlns:w10="urn:schemas-microsoft-com:office:word" xmlns:w="http://schemas.openxmlformats.org/wordprocessingml/2006/main" xmlns:a14="http://schemas.microsoft.com/office/drawing/2010/main" xmlns:w16se="http://schemas.microsoft.com/office/word/2015/wordml/symex" xmlns:w16cid="http://schemas.microsoft.com/office/word/2016/wordml/cid" xmlns:am3d="http://schemas.microsoft.com/office/drawing/2017/model3d" xmlns:aink="http://schemas.microsoft.com/office/drawing/2016/ink" xmlns:cx8="http://schemas.microsoft.com/office/drawing/2016/5/14/chartex" xmlns:cx7="http://schemas.microsoft.com/office/drawing/2016/5/13/chartex" xmlns:cx6="http://schemas.microsoft.com/office/drawing/2016/5/12/chartex" xmlns:cx5="http://schemas.microsoft.com/office/drawing/2016/5/11/chartex" xmlns:cx4="http://schemas.microsoft.com/office/drawing/2016/5/10/chartex" xmlns:cx3="http://schemas.microsoft.com/office/drawing/2016/5/9/chartex" xmlns:cx2="http://schemas.microsoft.com/office/drawing/2015/10/21/chartex" xmlns:cx1="http://schemas.microsoft.com/office/drawing/2015/9/8/chartex" xmlns:cx="http://schemas.microsoft.com/office/drawing/2014/chartex" xmlns:wps="http://schemas.microsoft.com/office/word/2010/wordprocessingShape" xmlns:wne="http://schemas.microsoft.com/office/word/2006/wordml" xmlns:wpi="http://schemas.microsoft.com/office/word/2010/wordprocessingInk" xmlns:wpg="http://schemas.microsoft.com/office/word/2010/wordprocessingGroup" xmlns:w15="http://schemas.microsoft.com/office/word/2012/wordml" xmlns:w14="http://schemas.microsoft.com/office/word/2010/wordml" xmlns:wp="http://schemas.openxmlformats.org/drawingml/2006/wordprocessingDrawing" xmlns:wp14="http://schemas.microsoft.com/office/word/2010/wordprocessingDrawing" xmlns:m="http://schemas.openxmlformats.org/officeDocument/2006/math" xmlns:mc="http://schemas.openxmlformats.org/markup-compatibility/2006" xmlns:wpc="http://schemas.microsoft.com/office/word/2010/wordprocessingCanvas">
+                <a14:hiddenFill xmlns:wpc="http://schemas.microsoft.com/office/word/2010/wordprocessingCanvas" xmlns:mc="http://schemas.openxmlformats.org/markup-compatibility/2006" xmlns:m="http://schemas.openxmlformats.org/officeDocument/2006/math" xmlns:wp14="http://schemas.microsoft.com/office/word/2010/wordprocessingDrawing" xmlns:wp="http://schemas.openxmlformats.org/drawingml/2006/wordprocessingDrawing" xmlns:w14="http://schemas.microsoft.com/office/word/2010/wordml" xmlns:w15="http://schemas.microsoft.com/office/word/2012/wordml" xmlns:wpg="http://schemas.microsoft.com/office/word/2010/wordprocessingGroup" xmlns:wpi="http://schemas.microsoft.com/office/word/2010/wordprocessingInk" xmlns:wne="http://schemas.microsoft.com/office/word/2006/wordml" xmlns:wps="http://schemas.microsoft.com/office/word/2010/wordprocessingShape" xmlns:cx="http://schemas.microsoft.com/office/drawing/2014/chartex" xmlns:cx1="http://schemas.microsoft.com/office/drawing/2015/9/8/chartex" xmlns:cx2="http://schemas.microsoft.com/office/drawing/2015/10/21/chartex" xmlns:cx3="http://schemas.microsoft.com/office/drawing/2016/5/9/chartex" xmlns:cx4="http://schemas.microsoft.com/office/drawing/2016/5/10/chartex" xmlns:cx5="http://schemas.microsoft.com/office/drawing/2016/5/11/chartex" xmlns:cx6="http://schemas.microsoft.com/office/drawing/2016/5/12/chartex" xmlns:cx7="http://schemas.microsoft.com/office/drawing/2016/5/13/chartex" xmlns:cx8="http://schemas.microsoft.com/office/drawing/2016/5/14/chartex" xmlns:aink="http://schemas.microsoft.com/office/drawing/2016/ink" xmlns:am3d="http://schemas.microsoft.com/office/drawing/2017/model3d" xmlns:w16cid="http://schemas.microsoft.com/office/word/2016/wordml/cid" xmlns:w16se="http://schemas.microsoft.com/office/word/2015/wordml/symex" xmlns:a14="http://schemas.microsoft.com/office/drawing/2010/main" xmlns:w="http://schemas.openxmlformats.org/wordprocessingml/2006/main" xmlns:w10="urn:schemas-microsoft-com:office:word" xmlns:v="urn:schemas-microsoft-com:vml" xmlns:o="urn:schemas-microsoft-com:office:office" xmlns:mv="urn:schemas-microsoft-com:mac:vml" xmlns:mo="http://schemas.microsoft.com/office/mac/office/2008/main" xmlns="" xmlns:arto="http://schemas.microsoft.com/office/word/2006/arto" xmlns:lc="http://schemas.openxmlformats.org/drawingml/2006/lockedCanvas">
                   <a:solidFill>
                     <a:srgbClr val="FFFFFF"/>
                   </a:solidFill>
@@ -3827,14 +3758,14 @@
             </a:ln>
             <a:extLst>
               <a:ext uri="{909E8E84-426E-40dd-AFC4-6F175D3DCCD1}">
-                <a14:hiddenFill xmlns:lc="http://schemas.openxmlformats.org/drawingml/2006/lockedCanvas" xmlns:arto="http://schemas.microsoft.com/office/word/2006/arto" xmlns="" xmlns:mo="http://schemas.microsoft.com/office/mac/office/2008/main" xmlns:mv="urn:schemas-microsoft-com:mac:vml" xmlns:o="urn:schemas-microsoft-com:office:office" xmlns:v="urn:schemas-microsoft-com:vml" xmlns:w10="urn:schemas-microsoft-com:office:word" xmlns:w="http://schemas.openxmlformats.org/wordprocessingml/2006/main" xmlns:a14="http://schemas.microsoft.com/office/drawing/2010/main" xmlns:w16se="http://schemas.microsoft.com/office/word/2015/wordml/symex" xmlns:w16cid="http://schemas.microsoft.com/office/word/2016/wordml/cid" xmlns:am3d="http://schemas.microsoft.com/office/drawing/2017/model3d" xmlns:aink="http://schemas.microsoft.com/office/drawing/2016/ink" xmlns:cx8="http://schemas.microsoft.com/office/drawing/2016/5/14/chartex" xmlns:cx7="http://schemas.microsoft.com/office/drawing/2016/5/13/chartex" xmlns:cx6="http://schemas.microsoft.com/office/drawing/2016/5/12/chartex" xmlns:cx5="http://schemas.microsoft.com/office/drawing/2016/5/11/chartex" xmlns:cx4="http://schemas.microsoft.com/office/drawing/2016/5/10/chartex" xmlns:cx3="http://schemas.microsoft.com/office/drawing/2016/5/9/chartex" xmlns:cx2="http://schemas.microsoft.com/office/drawing/2015/10/21/chartex" xmlns:cx1="http://schemas.microsoft.com/office/drawing/2015/9/8/chartex" xmlns:cx="http://schemas.microsoft.com/office/drawing/2014/chartex" xmlns:wps="http://schemas.microsoft.com/office/word/2010/wordprocessingShape" xmlns:wne="http://schemas.microsoft.com/office/word/2006/wordml" xmlns:wpi="http://schemas.microsoft.com/office/word/2010/wordprocessingInk" xmlns:wpg="http://schemas.microsoft.com/office/word/2010/wordprocessingGroup" xmlns:w15="http://schemas.microsoft.com/office/word/2012/wordml" xmlns:w14="http://schemas.microsoft.com/office/word/2010/wordml" xmlns:wp="http://schemas.openxmlformats.org/drawingml/2006/wordprocessingDrawing" xmlns:wp14="http://schemas.microsoft.com/office/word/2010/wordprocessingDrawing" xmlns:m="http://schemas.openxmlformats.org/officeDocument/2006/math" xmlns:mc="http://schemas.openxmlformats.org/markup-compatibility/2006" xmlns:wpc="http://schemas.microsoft.com/office/word/2010/wordprocessingCanvas">
+                <a14:hiddenFill xmlns:wpc="http://schemas.microsoft.com/office/word/2010/wordprocessingCanvas" xmlns:mc="http://schemas.openxmlformats.org/markup-compatibility/2006" xmlns:m="http://schemas.openxmlformats.org/officeDocument/2006/math" xmlns:wp14="http://schemas.microsoft.com/office/word/2010/wordprocessingDrawing" xmlns:wp="http://schemas.openxmlformats.org/drawingml/2006/wordprocessingDrawing" xmlns:w14="http://schemas.microsoft.com/office/word/2010/wordml" xmlns:w15="http://schemas.microsoft.com/office/word/2012/wordml" xmlns:wpg="http://schemas.microsoft.com/office/word/2010/wordprocessingGroup" xmlns:wpi="http://schemas.microsoft.com/office/word/2010/wordprocessingInk" xmlns:wne="http://schemas.microsoft.com/office/word/2006/wordml" xmlns:wps="http://schemas.microsoft.com/office/word/2010/wordprocessingShape" xmlns:cx="http://schemas.microsoft.com/office/drawing/2014/chartex" xmlns:cx1="http://schemas.microsoft.com/office/drawing/2015/9/8/chartex" xmlns:cx2="http://schemas.microsoft.com/office/drawing/2015/10/21/chartex" xmlns:cx3="http://schemas.microsoft.com/office/drawing/2016/5/9/chartex" xmlns:cx4="http://schemas.microsoft.com/office/drawing/2016/5/10/chartex" xmlns:cx5="http://schemas.microsoft.com/office/drawing/2016/5/11/chartex" xmlns:cx6="http://schemas.microsoft.com/office/drawing/2016/5/12/chartex" xmlns:cx7="http://schemas.microsoft.com/office/drawing/2016/5/13/chartex" xmlns:cx8="http://schemas.microsoft.com/office/drawing/2016/5/14/chartex" xmlns:aink="http://schemas.microsoft.com/office/drawing/2016/ink" xmlns:am3d="http://schemas.microsoft.com/office/drawing/2017/model3d" xmlns:w16cid="http://schemas.microsoft.com/office/word/2016/wordml/cid" xmlns:w16se="http://schemas.microsoft.com/office/word/2015/wordml/symex" xmlns:a14="http://schemas.microsoft.com/office/drawing/2010/main" xmlns:w="http://schemas.openxmlformats.org/wordprocessingml/2006/main" xmlns:w10="urn:schemas-microsoft-com:office:word" xmlns:v="urn:schemas-microsoft-com:vml" xmlns:o="urn:schemas-microsoft-com:office:office" xmlns:mv="urn:schemas-microsoft-com:mac:vml" xmlns:mo="http://schemas.microsoft.com/office/mac/office/2008/main" xmlns="" xmlns:arto="http://schemas.microsoft.com/office/word/2006/arto" xmlns:lc="http://schemas.openxmlformats.org/drawingml/2006/lockedCanvas">
                   <a:solidFill>
                     <a:srgbClr val="FFFFFF"/>
                   </a:solidFill>
                 </a14:hiddenFill>
               </a:ext>
               <a:ext uri="{91240B29-F687-4f45-9708-019B960494DF}">
-                <a14:hiddenLine xmlns:lc="http://schemas.openxmlformats.org/drawingml/2006/lockedCanvas" xmlns:arto="http://schemas.microsoft.com/office/word/2006/arto" xmlns="" xmlns:mo="http://schemas.microsoft.com/office/mac/office/2008/main" xmlns:mv="urn:schemas-microsoft-com:mac:vml" xmlns:o="urn:schemas-microsoft-com:office:office" xmlns:v="urn:schemas-microsoft-com:vml" xmlns:w10="urn:schemas-microsoft-com:office:word" xmlns:w="http://schemas.openxmlformats.org/wordprocessingml/2006/main" xmlns:a14="http://schemas.microsoft.com/office/drawing/2010/main" xmlns:w16se="http://schemas.microsoft.com/office/word/2015/wordml/symex" xmlns:w16cid="http://schemas.microsoft.com/office/word/2016/wordml/cid" xmlns:am3d="http://schemas.microsoft.com/office/drawing/2017/model3d" xmlns:aink="http://schemas.microsoft.com/office/drawing/2016/ink" xmlns:cx8="http://schemas.microsoft.com/office/drawing/2016/5/14/chartex" xmlns:cx7="http://schemas.microsoft.com/office/drawing/2016/5/13/chartex" xmlns:cx6="http://schemas.microsoft.com/office/drawing/2016/5/12/chartex" xmlns:cx5="http://schemas.microsoft.com/office/drawing/2016/5/11/chartex" xmlns:cx4="http://schemas.microsoft.com/office/drawing/2016/5/10/chartex" xmlns:cx3="http://schemas.microsoft.com/office/drawing/2016/5/9/chartex" xmlns:cx2="http://schemas.microsoft.com/office/drawing/2015/10/21/chartex" xmlns:cx1="http://schemas.microsoft.com/office/drawing/2015/9/8/chartex" xmlns:cx="http://schemas.microsoft.com/office/drawing/2014/chartex" xmlns:wps="http://schemas.microsoft.com/office/word/2010/wordprocessingShape" xmlns:wne="http://schemas.microsoft.com/office/word/2006/wordml" xmlns:wpi="http://schemas.microsoft.com/office/word/2010/wordprocessingInk" xmlns:wpg="http://schemas.microsoft.com/office/word/2010/wordprocessingGroup" xmlns:w15="http://schemas.microsoft.com/office/word/2012/wordml" xmlns:w14="http://schemas.microsoft.com/office/word/2010/wordml" xmlns:wp="http://schemas.openxmlformats.org/drawingml/2006/wordprocessingDrawing" xmlns:wp14="http://schemas.microsoft.com/office/word/2010/wordprocessingDrawing" xmlns:m="http://schemas.openxmlformats.org/officeDocument/2006/math" xmlns:mc="http://schemas.openxmlformats.org/markup-compatibility/2006" xmlns:wpc="http://schemas.microsoft.com/office/word/2010/wordprocessingCanvas" w="9525">
+                <a14:hiddenLine xmlns:wpc="http://schemas.microsoft.com/office/word/2010/wordprocessingCanvas" xmlns:mc="http://schemas.openxmlformats.org/markup-compatibility/2006" xmlns:m="http://schemas.openxmlformats.org/officeDocument/2006/math" xmlns:wp14="http://schemas.microsoft.com/office/word/2010/wordprocessingDrawing" xmlns:wp="http://schemas.openxmlformats.org/drawingml/2006/wordprocessingDrawing" xmlns:w14="http://schemas.microsoft.com/office/word/2010/wordml" xmlns:w15="http://schemas.microsoft.com/office/word/2012/wordml" xmlns:wpg="http://schemas.microsoft.com/office/word/2010/wordprocessingGroup" xmlns:wpi="http://schemas.microsoft.com/office/word/2010/wordprocessingInk" xmlns:wne="http://schemas.microsoft.com/office/word/2006/wordml" xmlns:wps="http://schemas.microsoft.com/office/word/2010/wordprocessingShape" xmlns:cx="http://schemas.microsoft.com/office/drawing/2014/chartex" xmlns:cx1="http://schemas.microsoft.com/office/drawing/2015/9/8/chartex" xmlns:cx2="http://schemas.microsoft.com/office/drawing/2015/10/21/chartex" xmlns:cx3="http://schemas.microsoft.com/office/drawing/2016/5/9/chartex" xmlns:cx4="http://schemas.microsoft.com/office/drawing/2016/5/10/chartex" xmlns:cx5="http://schemas.microsoft.com/office/drawing/2016/5/11/chartex" xmlns:cx6="http://schemas.microsoft.com/office/drawing/2016/5/12/chartex" xmlns:cx7="http://schemas.microsoft.com/office/drawing/2016/5/13/chartex" xmlns:cx8="http://schemas.microsoft.com/office/drawing/2016/5/14/chartex" xmlns:aink="http://schemas.microsoft.com/office/drawing/2016/ink" xmlns:am3d="http://schemas.microsoft.com/office/drawing/2017/model3d" xmlns:w16cid="http://schemas.microsoft.com/office/word/2016/wordml/cid" xmlns:w16se="http://schemas.microsoft.com/office/word/2015/wordml/symex" xmlns:a14="http://schemas.microsoft.com/office/drawing/2010/main" xmlns:w="http://schemas.openxmlformats.org/wordprocessingml/2006/main" xmlns:w10="urn:schemas-microsoft-com:office:word" xmlns:v="urn:schemas-microsoft-com:vml" xmlns:o="urn:schemas-microsoft-com:office:office" xmlns:mv="urn:schemas-microsoft-com:mac:vml" xmlns:mo="http://schemas.microsoft.com/office/mac/office/2008/main" xmlns="" xmlns:arto="http://schemas.microsoft.com/office/word/2006/arto" xmlns:lc="http://schemas.openxmlformats.org/drawingml/2006/lockedCanvas" w="9525">
                   <a:solidFill>
                     <a:srgbClr val="000000"/>
                   </a:solidFill>
@@ -3924,14 +3855,14 @@
             </a:ln>
             <a:extLst>
               <a:ext uri="{909E8E84-426E-40dd-AFC4-6F175D3DCCD1}">
-                <a14:hiddenFill xmlns:lc="http://schemas.openxmlformats.org/drawingml/2006/lockedCanvas" xmlns:arto="http://schemas.microsoft.com/office/word/2006/arto" xmlns="" xmlns:mo="http://schemas.microsoft.com/office/mac/office/2008/main" xmlns:mv="urn:schemas-microsoft-com:mac:vml" xmlns:o="urn:schemas-microsoft-com:office:office" xmlns:v="urn:schemas-microsoft-com:vml" xmlns:w10="urn:schemas-microsoft-com:office:word" xmlns:w="http://schemas.openxmlformats.org/wordprocessingml/2006/main" xmlns:a14="http://schemas.microsoft.com/office/drawing/2010/main" xmlns:w16se="http://schemas.microsoft.com/office/word/2015/wordml/symex" xmlns:w16cid="http://schemas.microsoft.com/office/word/2016/wordml/cid" xmlns:am3d="http://schemas.microsoft.com/office/drawing/2017/model3d" xmlns:aink="http://schemas.microsoft.com/office/drawing/2016/ink" xmlns:cx8="http://schemas.microsoft.com/office/drawing/2016/5/14/chartex" xmlns:cx7="http://schemas.microsoft.com/office/drawing/2016/5/13/chartex" xmlns:cx6="http://schemas.microsoft.com/office/drawing/2016/5/12/chartex" xmlns:cx5="http://schemas.microsoft.com/office/drawing/2016/5/11/chartex" xmlns:cx4="http://schemas.microsoft.com/office/drawing/2016/5/10/chartex" xmlns:cx3="http://schemas.microsoft.com/office/drawing/2016/5/9/chartex" xmlns:cx2="http://schemas.microsoft.com/office/drawing/2015/10/21/chartex" xmlns:cx1="http://schemas.microsoft.com/office/drawing/2015/9/8/chartex" xmlns:cx="http://schemas.microsoft.com/office/drawing/2014/chartex" xmlns:wps="http://schemas.microsoft.com/office/word/2010/wordprocessingShape" xmlns:wne="http://schemas.microsoft.com/office/word/2006/wordml" xmlns:wpi="http://schemas.microsoft.com/office/word/2010/wordprocessingInk" xmlns:wpg="http://schemas.microsoft.com/office/word/2010/wordprocessingGroup" xmlns:w15="http://schemas.microsoft.com/office/word/2012/wordml" xmlns:w14="http://schemas.microsoft.com/office/word/2010/wordml" xmlns:wp="http://schemas.openxmlformats.org/drawingml/2006/wordprocessingDrawing" xmlns:wp14="http://schemas.microsoft.com/office/word/2010/wordprocessingDrawing" xmlns:m="http://schemas.openxmlformats.org/officeDocument/2006/math" xmlns:mc="http://schemas.openxmlformats.org/markup-compatibility/2006" xmlns:wpc="http://schemas.microsoft.com/office/word/2010/wordprocessingCanvas">
+                <a14:hiddenFill xmlns:wpc="http://schemas.microsoft.com/office/word/2010/wordprocessingCanvas" xmlns:mc="http://schemas.openxmlformats.org/markup-compatibility/2006" xmlns:m="http://schemas.openxmlformats.org/officeDocument/2006/math" xmlns:wp14="http://schemas.microsoft.com/office/word/2010/wordprocessingDrawing" xmlns:wp="http://schemas.openxmlformats.org/drawingml/2006/wordprocessingDrawing" xmlns:w14="http://schemas.microsoft.com/office/word/2010/wordml" xmlns:w15="http://schemas.microsoft.com/office/word/2012/wordml" xmlns:wpg="http://schemas.microsoft.com/office/word/2010/wordprocessingGroup" xmlns:wpi="http://schemas.microsoft.com/office/word/2010/wordprocessingInk" xmlns:wne="http://schemas.microsoft.com/office/word/2006/wordml" xmlns:wps="http://schemas.microsoft.com/office/word/2010/wordprocessingShape" xmlns:cx="http://schemas.microsoft.com/office/drawing/2014/chartex" xmlns:cx1="http://schemas.microsoft.com/office/drawing/2015/9/8/chartex" xmlns:cx2="http://schemas.microsoft.com/office/drawing/2015/10/21/chartex" xmlns:cx3="http://schemas.microsoft.com/office/drawing/2016/5/9/chartex" xmlns:cx4="http://schemas.microsoft.com/office/drawing/2016/5/10/chartex" xmlns:cx5="http://schemas.microsoft.com/office/drawing/2016/5/11/chartex" xmlns:cx6="http://schemas.microsoft.com/office/drawing/2016/5/12/chartex" xmlns:cx7="http://schemas.microsoft.com/office/drawing/2016/5/13/chartex" xmlns:cx8="http://schemas.microsoft.com/office/drawing/2016/5/14/chartex" xmlns:aink="http://schemas.microsoft.com/office/drawing/2016/ink" xmlns:am3d="http://schemas.microsoft.com/office/drawing/2017/model3d" xmlns:w16cid="http://schemas.microsoft.com/office/word/2016/wordml/cid" xmlns:w16se="http://schemas.microsoft.com/office/word/2015/wordml/symex" xmlns:a14="http://schemas.microsoft.com/office/drawing/2010/main" xmlns:w="http://schemas.openxmlformats.org/wordprocessingml/2006/main" xmlns:w10="urn:schemas-microsoft-com:office:word" xmlns:v="urn:schemas-microsoft-com:vml" xmlns:o="urn:schemas-microsoft-com:office:office" xmlns:mv="urn:schemas-microsoft-com:mac:vml" xmlns:mo="http://schemas.microsoft.com/office/mac/office/2008/main" xmlns="" xmlns:arto="http://schemas.microsoft.com/office/word/2006/arto" xmlns:lc="http://schemas.openxmlformats.org/drawingml/2006/lockedCanvas">
                   <a:solidFill>
                     <a:srgbClr val="FFFFFF"/>
                   </a:solidFill>
                 </a14:hiddenFill>
               </a:ext>
               <a:ext uri="{91240B29-F687-4f45-9708-019B960494DF}">
-                <a14:hiddenLine xmlns:lc="http://schemas.openxmlformats.org/drawingml/2006/lockedCanvas" xmlns:arto="http://schemas.microsoft.com/office/word/2006/arto" xmlns="" xmlns:mo="http://schemas.microsoft.com/office/mac/office/2008/main" xmlns:mv="urn:schemas-microsoft-com:mac:vml" xmlns:o="urn:schemas-microsoft-com:office:office" xmlns:v="urn:schemas-microsoft-com:vml" xmlns:w10="urn:schemas-microsoft-com:office:word" xmlns:w="http://schemas.openxmlformats.org/wordprocessingml/2006/main" xmlns:a14="http://schemas.microsoft.com/office/drawing/2010/main" xmlns:w16se="http://schemas.microsoft.com/office/word/2015/wordml/symex" xmlns:w16cid="http://schemas.microsoft.com/office/word/2016/wordml/cid" xmlns:am3d="http://schemas.microsoft.com/office/drawing/2017/model3d" xmlns:aink="http://schemas.microsoft.com/office/drawing/2016/ink" xmlns:cx8="http://schemas.microsoft.com/office/drawing/2016/5/14/chartex" xmlns:cx7="http://schemas.microsoft.com/office/drawing/2016/5/13/chartex" xmlns:cx6="http://schemas.microsoft.com/office/drawing/2016/5/12/chartex" xmlns:cx5="http://schemas.microsoft.com/office/drawing/2016/5/11/chartex" xmlns:cx4="http://schemas.microsoft.com/office/drawing/2016/5/10/chartex" xmlns:cx3="http://schemas.microsoft.com/office/drawing/2016/5/9/chartex" xmlns:cx2="http://schemas.microsoft.com/office/drawing/2015/10/21/chartex" xmlns:cx1="http://schemas.microsoft.com/office/drawing/2015/9/8/chartex" xmlns:cx="http://schemas.microsoft.com/office/drawing/2014/chartex" xmlns:wps="http://schemas.microsoft.com/office/word/2010/wordprocessingShape" xmlns:wne="http://schemas.microsoft.com/office/word/2006/wordml" xmlns:wpi="http://schemas.microsoft.com/office/word/2010/wordprocessingInk" xmlns:wpg="http://schemas.microsoft.com/office/word/2010/wordprocessingGroup" xmlns:w15="http://schemas.microsoft.com/office/word/2012/wordml" xmlns:w14="http://schemas.microsoft.com/office/word/2010/wordml" xmlns:wp="http://schemas.openxmlformats.org/drawingml/2006/wordprocessingDrawing" xmlns:wp14="http://schemas.microsoft.com/office/word/2010/wordprocessingDrawing" xmlns:m="http://schemas.openxmlformats.org/officeDocument/2006/math" xmlns:mc="http://schemas.openxmlformats.org/markup-compatibility/2006" xmlns:wpc="http://schemas.microsoft.com/office/word/2010/wordprocessingCanvas" w="3175">
+                <a14:hiddenLine xmlns:wpc="http://schemas.microsoft.com/office/word/2010/wordprocessingCanvas" xmlns:mc="http://schemas.openxmlformats.org/markup-compatibility/2006" xmlns:m="http://schemas.openxmlformats.org/officeDocument/2006/math" xmlns:wp14="http://schemas.microsoft.com/office/word/2010/wordprocessingDrawing" xmlns:wp="http://schemas.openxmlformats.org/drawingml/2006/wordprocessingDrawing" xmlns:w14="http://schemas.microsoft.com/office/word/2010/wordml" xmlns:w15="http://schemas.microsoft.com/office/word/2012/wordml" xmlns:wpg="http://schemas.microsoft.com/office/word/2010/wordprocessingGroup" xmlns:wpi="http://schemas.microsoft.com/office/word/2010/wordprocessingInk" xmlns:wne="http://schemas.microsoft.com/office/word/2006/wordml" xmlns:wps="http://schemas.microsoft.com/office/word/2010/wordprocessingShape" xmlns:cx="http://schemas.microsoft.com/office/drawing/2014/chartex" xmlns:cx1="http://schemas.microsoft.com/office/drawing/2015/9/8/chartex" xmlns:cx2="http://schemas.microsoft.com/office/drawing/2015/10/21/chartex" xmlns:cx3="http://schemas.microsoft.com/office/drawing/2016/5/9/chartex" xmlns:cx4="http://schemas.microsoft.com/office/drawing/2016/5/10/chartex" xmlns:cx5="http://schemas.microsoft.com/office/drawing/2016/5/11/chartex" xmlns:cx6="http://schemas.microsoft.com/office/drawing/2016/5/12/chartex" xmlns:cx7="http://schemas.microsoft.com/office/drawing/2016/5/13/chartex" xmlns:cx8="http://schemas.microsoft.com/office/drawing/2016/5/14/chartex" xmlns:aink="http://schemas.microsoft.com/office/drawing/2016/ink" xmlns:am3d="http://schemas.microsoft.com/office/drawing/2017/model3d" xmlns:w16cid="http://schemas.microsoft.com/office/word/2016/wordml/cid" xmlns:w16se="http://schemas.microsoft.com/office/word/2015/wordml/symex" xmlns:a14="http://schemas.microsoft.com/office/drawing/2010/main" xmlns:w="http://schemas.openxmlformats.org/wordprocessingml/2006/main" xmlns:w10="urn:schemas-microsoft-com:office:word" xmlns:v="urn:schemas-microsoft-com:vml" xmlns:o="urn:schemas-microsoft-com:office:office" xmlns:mv="urn:schemas-microsoft-com:mac:vml" xmlns:mo="http://schemas.microsoft.com/office/mac/office/2008/main" xmlns="" xmlns:arto="http://schemas.microsoft.com/office/word/2006/arto" xmlns:lc="http://schemas.openxmlformats.org/drawingml/2006/lockedCanvas" w="3175">
                   <a:solidFill>
                     <a:srgbClr val="000000"/>
                   </a:solidFill>
@@ -3995,14 +3926,14 @@
             </a:ln>
             <a:extLst>
               <a:ext uri="{909E8E84-426E-40dd-AFC4-6F175D3DCCD1}">
-                <a14:hiddenFill xmlns:lc="http://schemas.openxmlformats.org/drawingml/2006/lockedCanvas" xmlns:arto="http://schemas.microsoft.com/office/word/2006/arto" xmlns="" xmlns:mo="http://schemas.microsoft.com/office/mac/office/2008/main" xmlns:mv="urn:schemas-microsoft-com:mac:vml" xmlns:o="urn:schemas-microsoft-com:office:office" xmlns:v="urn:schemas-microsoft-com:vml" xmlns:w10="urn:schemas-microsoft-com:office:word" xmlns:w="http://schemas.openxmlformats.org/wordprocessingml/2006/main" xmlns:a14="http://schemas.microsoft.com/office/drawing/2010/main" xmlns:w16se="http://schemas.microsoft.com/office/word/2015/wordml/symex" xmlns:w16cid="http://schemas.microsoft.com/office/word/2016/wordml/cid" xmlns:am3d="http://schemas.microsoft.com/office/drawing/2017/model3d" xmlns:aink="http://schemas.microsoft.com/office/drawing/2016/ink" xmlns:cx8="http://schemas.microsoft.com/office/drawing/2016/5/14/chartex" xmlns:cx7="http://schemas.microsoft.com/office/drawing/2016/5/13/chartex" xmlns:cx6="http://schemas.microsoft.com/office/drawing/2016/5/12/chartex" xmlns:cx5="http://schemas.microsoft.com/office/drawing/2016/5/11/chartex" xmlns:cx4="http://schemas.microsoft.com/office/drawing/2016/5/10/chartex" xmlns:cx3="http://schemas.microsoft.com/office/drawing/2016/5/9/chartex" xmlns:cx2="http://schemas.microsoft.com/office/drawing/2015/10/21/chartex" xmlns:cx1="http://schemas.microsoft.com/office/drawing/2015/9/8/chartex" xmlns:cx="http://schemas.microsoft.com/office/drawing/2014/chartex" xmlns:wps="http://schemas.microsoft.com/office/word/2010/wordprocessingShape" xmlns:wne="http://schemas.microsoft.com/office/word/2006/wordml" xmlns:wpi="http://schemas.microsoft.com/office/word/2010/wordprocessingInk" xmlns:wpg="http://schemas.microsoft.com/office/word/2010/wordprocessingGroup" xmlns:w15="http://schemas.microsoft.com/office/word/2012/wordml" xmlns:w14="http://schemas.microsoft.com/office/word/2010/wordml" xmlns:wp="http://schemas.openxmlformats.org/drawingml/2006/wordprocessingDrawing" xmlns:wp14="http://schemas.microsoft.com/office/word/2010/wordprocessingDrawing" xmlns:m="http://schemas.openxmlformats.org/officeDocument/2006/math" xmlns:mc="http://schemas.openxmlformats.org/markup-compatibility/2006" xmlns:wpc="http://schemas.microsoft.com/office/word/2010/wordprocessingCanvas">
+                <a14:hiddenFill xmlns:wpc="http://schemas.microsoft.com/office/word/2010/wordprocessingCanvas" xmlns:mc="http://schemas.openxmlformats.org/markup-compatibility/2006" xmlns:m="http://schemas.openxmlformats.org/officeDocument/2006/math" xmlns:wp14="http://schemas.microsoft.com/office/word/2010/wordprocessingDrawing" xmlns:wp="http://schemas.openxmlformats.org/drawingml/2006/wordprocessingDrawing" xmlns:w14="http://schemas.microsoft.com/office/word/2010/wordml" xmlns:w15="http://schemas.microsoft.com/office/word/2012/wordml" xmlns:wpg="http://schemas.microsoft.com/office/word/2010/wordprocessingGroup" xmlns:wpi="http://schemas.microsoft.com/office/word/2010/wordprocessingInk" xmlns:wne="http://schemas.microsoft.com/office/word/2006/wordml" xmlns:wps="http://schemas.microsoft.com/office/word/2010/wordprocessingShape" xmlns:cx="http://schemas.microsoft.com/office/drawing/2014/chartex" xmlns:cx1="http://schemas.microsoft.com/office/drawing/2015/9/8/chartex" xmlns:cx2="http://schemas.microsoft.com/office/drawing/2015/10/21/chartex" xmlns:cx3="http://schemas.microsoft.com/office/drawing/2016/5/9/chartex" xmlns:cx4="http://schemas.microsoft.com/office/drawing/2016/5/10/chartex" xmlns:cx5="http://schemas.microsoft.com/office/drawing/2016/5/11/chartex" xmlns:cx6="http://schemas.microsoft.com/office/drawing/2016/5/12/chartex" xmlns:cx7="http://schemas.microsoft.com/office/drawing/2016/5/13/chartex" xmlns:cx8="http://schemas.microsoft.com/office/drawing/2016/5/14/chartex" xmlns:aink="http://schemas.microsoft.com/office/drawing/2016/ink" xmlns:am3d="http://schemas.microsoft.com/office/drawing/2017/model3d" xmlns:w16cid="http://schemas.microsoft.com/office/word/2016/wordml/cid" xmlns:w16se="http://schemas.microsoft.com/office/word/2015/wordml/symex" xmlns:a14="http://schemas.microsoft.com/office/drawing/2010/main" xmlns:w="http://schemas.openxmlformats.org/wordprocessingml/2006/main" xmlns:w10="urn:schemas-microsoft-com:office:word" xmlns:v="urn:schemas-microsoft-com:vml" xmlns:o="urn:schemas-microsoft-com:office:office" xmlns:mv="urn:schemas-microsoft-com:mac:vml" xmlns:mo="http://schemas.microsoft.com/office/mac/office/2008/main" xmlns="" xmlns:arto="http://schemas.microsoft.com/office/word/2006/arto" xmlns:lc="http://schemas.openxmlformats.org/drawingml/2006/lockedCanvas">
                   <a:solidFill>
                     <a:srgbClr val="FFFFFF"/>
                   </a:solidFill>
                 </a14:hiddenFill>
               </a:ext>
               <a:ext uri="{91240B29-F687-4f45-9708-019B960494DF}">
-                <a14:hiddenLine xmlns:lc="http://schemas.openxmlformats.org/drawingml/2006/lockedCanvas" xmlns:arto="http://schemas.microsoft.com/office/word/2006/arto" xmlns="" xmlns:mo="http://schemas.microsoft.com/office/mac/office/2008/main" xmlns:mv="urn:schemas-microsoft-com:mac:vml" xmlns:o="urn:schemas-microsoft-com:office:office" xmlns:v="urn:schemas-microsoft-com:vml" xmlns:w10="urn:schemas-microsoft-com:office:word" xmlns:w="http://schemas.openxmlformats.org/wordprocessingml/2006/main" xmlns:a14="http://schemas.microsoft.com/office/drawing/2010/main" xmlns:w16se="http://schemas.microsoft.com/office/word/2015/wordml/symex" xmlns:w16cid="http://schemas.microsoft.com/office/word/2016/wordml/cid" xmlns:am3d="http://schemas.microsoft.com/office/drawing/2017/model3d" xmlns:aink="http://schemas.microsoft.com/office/drawing/2016/ink" xmlns:cx8="http://schemas.microsoft.com/office/drawing/2016/5/14/chartex" xmlns:cx7="http://schemas.microsoft.com/office/drawing/2016/5/13/chartex" xmlns:cx6="http://schemas.microsoft.com/office/drawing/2016/5/12/chartex" xmlns:cx5="http://schemas.microsoft.com/office/drawing/2016/5/11/chartex" xmlns:cx4="http://schemas.microsoft.com/office/drawing/2016/5/10/chartex" xmlns:cx3="http://schemas.microsoft.com/office/drawing/2016/5/9/chartex" xmlns:cx2="http://schemas.microsoft.com/office/drawing/2015/10/21/chartex" xmlns:cx1="http://schemas.microsoft.com/office/drawing/2015/9/8/chartex" xmlns:cx="http://schemas.microsoft.com/office/drawing/2014/chartex" xmlns:wps="http://schemas.microsoft.com/office/word/2010/wordprocessingShape" xmlns:wne="http://schemas.microsoft.com/office/word/2006/wordml" xmlns:wpi="http://schemas.microsoft.com/office/word/2010/wordprocessingInk" xmlns:wpg="http://schemas.microsoft.com/office/word/2010/wordprocessingGroup" xmlns:w15="http://schemas.microsoft.com/office/word/2012/wordml" xmlns:w14="http://schemas.microsoft.com/office/word/2010/wordml" xmlns:wp="http://schemas.openxmlformats.org/drawingml/2006/wordprocessingDrawing" xmlns:wp14="http://schemas.microsoft.com/office/word/2010/wordprocessingDrawing" xmlns:m="http://schemas.openxmlformats.org/officeDocument/2006/math" xmlns:mc="http://schemas.openxmlformats.org/markup-compatibility/2006" xmlns:wpc="http://schemas.microsoft.com/office/word/2010/wordprocessingCanvas" w="3175">
+                <a14:hiddenLine xmlns:wpc="http://schemas.microsoft.com/office/word/2010/wordprocessingCanvas" xmlns:mc="http://schemas.openxmlformats.org/markup-compatibility/2006" xmlns:m="http://schemas.openxmlformats.org/officeDocument/2006/math" xmlns:wp14="http://schemas.microsoft.com/office/word/2010/wordprocessingDrawing" xmlns:wp="http://schemas.openxmlformats.org/drawingml/2006/wordprocessingDrawing" xmlns:w14="http://schemas.microsoft.com/office/word/2010/wordml" xmlns:w15="http://schemas.microsoft.com/office/word/2012/wordml" xmlns:wpg="http://schemas.microsoft.com/office/word/2010/wordprocessingGroup" xmlns:wpi="http://schemas.microsoft.com/office/word/2010/wordprocessingInk" xmlns:wne="http://schemas.microsoft.com/office/word/2006/wordml" xmlns:wps="http://schemas.microsoft.com/office/word/2010/wordprocessingShape" xmlns:cx="http://schemas.microsoft.com/office/drawing/2014/chartex" xmlns:cx1="http://schemas.microsoft.com/office/drawing/2015/9/8/chartex" xmlns:cx2="http://schemas.microsoft.com/office/drawing/2015/10/21/chartex" xmlns:cx3="http://schemas.microsoft.com/office/drawing/2016/5/9/chartex" xmlns:cx4="http://schemas.microsoft.com/office/drawing/2016/5/10/chartex" xmlns:cx5="http://schemas.microsoft.com/office/drawing/2016/5/11/chartex" xmlns:cx6="http://schemas.microsoft.com/office/drawing/2016/5/12/chartex" xmlns:cx7="http://schemas.microsoft.com/office/drawing/2016/5/13/chartex" xmlns:cx8="http://schemas.microsoft.com/office/drawing/2016/5/14/chartex" xmlns:aink="http://schemas.microsoft.com/office/drawing/2016/ink" xmlns:am3d="http://schemas.microsoft.com/office/drawing/2017/model3d" xmlns:w16cid="http://schemas.microsoft.com/office/word/2016/wordml/cid" xmlns:w16se="http://schemas.microsoft.com/office/word/2015/wordml/symex" xmlns:a14="http://schemas.microsoft.com/office/drawing/2010/main" xmlns:w="http://schemas.openxmlformats.org/wordprocessingml/2006/main" xmlns:w10="urn:schemas-microsoft-com:office:word" xmlns:v="urn:schemas-microsoft-com:vml" xmlns:o="urn:schemas-microsoft-com:office:office" xmlns:mv="urn:schemas-microsoft-com:mac:vml" xmlns:mo="http://schemas.microsoft.com/office/mac/office/2008/main" xmlns="" xmlns:arto="http://schemas.microsoft.com/office/word/2006/arto" xmlns:lc="http://schemas.openxmlformats.org/drawingml/2006/lockedCanvas" w="3175">
                   <a:solidFill>
                     <a:srgbClr val="000000"/>
                   </a:solidFill>
@@ -4137,7 +4068,7 @@
             </a:ln>
             <a:extLst>
               <a:ext uri="{909E8E84-426E-40dd-AFC4-6F175D3DCCD1}">
-                <a14:hiddenFill xmlns:lc="http://schemas.openxmlformats.org/drawingml/2006/lockedCanvas" xmlns:arto="http://schemas.microsoft.com/office/word/2006/arto" xmlns="" xmlns:mo="http://schemas.microsoft.com/office/mac/office/2008/main" xmlns:mv="urn:schemas-microsoft-com:mac:vml" xmlns:o="urn:schemas-microsoft-com:office:office" xmlns:v="urn:schemas-microsoft-com:vml" xmlns:w10="urn:schemas-microsoft-com:office:word" xmlns:w="http://schemas.openxmlformats.org/wordprocessingml/2006/main" xmlns:a14="http://schemas.microsoft.com/office/drawing/2010/main" xmlns:w16se="http://schemas.microsoft.com/office/word/2015/wordml/symex" xmlns:w16cid="http://schemas.microsoft.com/office/word/2016/wordml/cid" xmlns:am3d="http://schemas.microsoft.com/office/drawing/2017/model3d" xmlns:aink="http://schemas.microsoft.com/office/drawing/2016/ink" xmlns:cx8="http://schemas.microsoft.com/office/drawing/2016/5/14/chartex" xmlns:cx7="http://schemas.microsoft.com/office/drawing/2016/5/13/chartex" xmlns:cx6="http://schemas.microsoft.com/office/drawing/2016/5/12/chartex" xmlns:cx5="http://schemas.microsoft.com/office/drawing/2016/5/11/chartex" xmlns:cx4="http://schemas.microsoft.com/office/drawing/2016/5/10/chartex" xmlns:cx3="http://schemas.microsoft.com/office/drawing/2016/5/9/chartex" xmlns:cx2="http://schemas.microsoft.com/office/drawing/2015/10/21/chartex" xmlns:cx1="http://schemas.microsoft.com/office/drawing/2015/9/8/chartex" xmlns:cx="http://schemas.microsoft.com/office/drawing/2014/chartex" xmlns:wps="http://schemas.microsoft.com/office/word/2010/wordprocessingShape" xmlns:wne="http://schemas.microsoft.com/office/word/2006/wordml" xmlns:wpi="http://schemas.microsoft.com/office/word/2010/wordprocessingInk" xmlns:wpg="http://schemas.microsoft.com/office/word/2010/wordprocessingGroup" xmlns:w15="http://schemas.microsoft.com/office/word/2012/wordml" xmlns:w14="http://schemas.microsoft.com/office/word/2010/wordml" xmlns:wp="http://schemas.openxmlformats.org/drawingml/2006/wordprocessingDrawing" xmlns:wp14="http://schemas.microsoft.com/office/word/2010/wordprocessingDrawing" xmlns:m="http://schemas.openxmlformats.org/officeDocument/2006/math" xmlns:mc="http://schemas.openxmlformats.org/markup-compatibility/2006" xmlns:wpc="http://schemas.microsoft.com/office/word/2010/wordprocessingCanvas">
+                <a14:hiddenFill xmlns:wpc="http://schemas.microsoft.com/office/word/2010/wordprocessingCanvas" xmlns:mc="http://schemas.openxmlformats.org/markup-compatibility/2006" xmlns:m="http://schemas.openxmlformats.org/officeDocument/2006/math" xmlns:wp14="http://schemas.microsoft.com/office/word/2010/wordprocessingDrawing" xmlns:wp="http://schemas.openxmlformats.org/drawingml/2006/wordprocessingDrawing" xmlns:w14="http://schemas.microsoft.com/office/word/2010/wordml" xmlns:w15="http://schemas.microsoft.com/office/word/2012/wordml" xmlns:wpg="http://schemas.microsoft.com/office/word/2010/wordprocessingGroup" xmlns:wpi="http://schemas.microsoft.com/office/word/2010/wordprocessingInk" xmlns:wne="http://schemas.microsoft.com/office/word/2006/wordml" xmlns:wps="http://schemas.microsoft.com/office/word/2010/wordprocessingShape" xmlns:cx="http://schemas.microsoft.com/office/drawing/2014/chartex" xmlns:cx1="http://schemas.microsoft.com/office/drawing/2015/9/8/chartex" xmlns:cx2="http://schemas.microsoft.com/office/drawing/2015/10/21/chartex" xmlns:cx3="http://schemas.microsoft.com/office/drawing/2016/5/9/chartex" xmlns:cx4="http://schemas.microsoft.com/office/drawing/2016/5/10/chartex" xmlns:cx5="http://schemas.microsoft.com/office/drawing/2016/5/11/chartex" xmlns:cx6="http://schemas.microsoft.com/office/drawing/2016/5/12/chartex" xmlns:cx7="http://schemas.microsoft.com/office/drawing/2016/5/13/chartex" xmlns:cx8="http://schemas.microsoft.com/office/drawing/2016/5/14/chartex" xmlns:aink="http://schemas.microsoft.com/office/drawing/2016/ink" xmlns:am3d="http://schemas.microsoft.com/office/drawing/2017/model3d" xmlns:w16cid="http://schemas.microsoft.com/office/word/2016/wordml/cid" xmlns:w16se="http://schemas.microsoft.com/office/word/2015/wordml/symex" xmlns:a14="http://schemas.microsoft.com/office/drawing/2010/main" xmlns:w="http://schemas.openxmlformats.org/wordprocessingml/2006/main" xmlns:w10="urn:schemas-microsoft-com:office:word" xmlns:v="urn:schemas-microsoft-com:vml" xmlns:o="urn:schemas-microsoft-com:office:office" xmlns:mv="urn:schemas-microsoft-com:mac:vml" xmlns:mo="http://schemas.microsoft.com/office/mac/office/2008/main" xmlns="" xmlns:arto="http://schemas.microsoft.com/office/word/2006/arto" xmlns:lc="http://schemas.openxmlformats.org/drawingml/2006/lockedCanvas">
                   <a:solidFill>
                     <a:srgbClr val="FFFFFF"/>
                   </a:solidFill>
@@ -4207,14 +4138,14 @@
             </a:ln>
             <a:extLst>
               <a:ext uri="{909E8E84-426E-40dd-AFC4-6F175D3DCCD1}">
-                <a14:hiddenFill xmlns:lc="http://schemas.openxmlformats.org/drawingml/2006/lockedCanvas" xmlns:arto="http://schemas.microsoft.com/office/word/2006/arto" xmlns="" xmlns:mo="http://schemas.microsoft.com/office/mac/office/2008/main" xmlns:mv="urn:schemas-microsoft-com:mac:vml" xmlns:o="urn:schemas-microsoft-com:office:office" xmlns:v="urn:schemas-microsoft-com:vml" xmlns:w10="urn:schemas-microsoft-com:office:word" xmlns:w="http://schemas.openxmlformats.org/wordprocessingml/2006/main" xmlns:a14="http://schemas.microsoft.com/office/drawing/2010/main" xmlns:w16se="http://schemas.microsoft.com/office/word/2015/wordml/symex" xmlns:w16cid="http://schemas.microsoft.com/office/word/2016/wordml/cid" xmlns:am3d="http://schemas.microsoft.com/office/drawing/2017/model3d" xmlns:aink="http://schemas.microsoft.com/office/drawing/2016/ink" xmlns:cx8="http://schemas.microsoft.com/office/drawing/2016/5/14/chartex" xmlns:cx7="http://schemas.microsoft.com/office/drawing/2016/5/13/chartex" xmlns:cx6="http://schemas.microsoft.com/office/drawing/2016/5/12/chartex" xmlns:cx5="http://schemas.microsoft.com/office/drawing/2016/5/11/chartex" xmlns:cx4="http://schemas.microsoft.com/office/drawing/2016/5/10/chartex" xmlns:cx3="http://schemas.microsoft.com/office/drawing/2016/5/9/chartex" xmlns:cx2="http://schemas.microsoft.com/office/drawing/2015/10/21/chartex" xmlns:cx1="http://schemas.microsoft.com/office/drawing/2015/9/8/chartex" xmlns:cx="http://schemas.microsoft.com/office/drawing/2014/chartex" xmlns:wps="http://schemas.microsoft.com/office/word/2010/wordprocessingShape" xmlns:wne="http://schemas.microsoft.com/office/word/2006/wordml" xmlns:wpi="http://schemas.microsoft.com/office/word/2010/wordprocessingInk" xmlns:wpg="http://schemas.microsoft.com/office/word/2010/wordprocessingGroup" xmlns:w15="http://schemas.microsoft.com/office/word/2012/wordml" xmlns:w14="http://schemas.microsoft.com/office/word/2010/wordml" xmlns:wp="http://schemas.openxmlformats.org/drawingml/2006/wordprocessingDrawing" xmlns:wp14="http://schemas.microsoft.com/office/word/2010/wordprocessingDrawing" xmlns:m="http://schemas.openxmlformats.org/officeDocument/2006/math" xmlns:mc="http://schemas.openxmlformats.org/markup-compatibility/2006" xmlns:wpc="http://schemas.microsoft.com/office/word/2010/wordprocessingCanvas">
+                <a14:hiddenFill xmlns:wpc="http://schemas.microsoft.com/office/word/2010/wordprocessingCanvas" xmlns:mc="http://schemas.openxmlformats.org/markup-compatibility/2006" xmlns:m="http://schemas.openxmlformats.org/officeDocument/2006/math" xmlns:wp14="http://schemas.microsoft.com/office/word/2010/wordprocessingDrawing" xmlns:wp="http://schemas.openxmlformats.org/drawingml/2006/wordprocessingDrawing" xmlns:w14="http://schemas.microsoft.com/office/word/2010/wordml" xmlns:w15="http://schemas.microsoft.com/office/word/2012/wordml" xmlns:wpg="http://schemas.microsoft.com/office/word/2010/wordprocessingGroup" xmlns:wpi="http://schemas.microsoft.com/office/word/2010/wordprocessingInk" xmlns:wne="http://schemas.microsoft.com/office/word/2006/wordml" xmlns:wps="http://schemas.microsoft.com/office/word/2010/wordprocessingShape" xmlns:cx="http://schemas.microsoft.com/office/drawing/2014/chartex" xmlns:cx1="http://schemas.microsoft.com/office/drawing/2015/9/8/chartex" xmlns:cx2="http://schemas.microsoft.com/office/drawing/2015/10/21/chartex" xmlns:cx3="http://schemas.microsoft.com/office/drawing/2016/5/9/chartex" xmlns:cx4="http://schemas.microsoft.com/office/drawing/2016/5/10/chartex" xmlns:cx5="http://schemas.microsoft.com/office/drawing/2016/5/11/chartex" xmlns:cx6="http://schemas.microsoft.com/office/drawing/2016/5/12/chartex" xmlns:cx7="http://schemas.microsoft.com/office/drawing/2016/5/13/chartex" xmlns:cx8="http://schemas.microsoft.com/office/drawing/2016/5/14/chartex" xmlns:aink="http://schemas.microsoft.com/office/drawing/2016/ink" xmlns:am3d="http://schemas.microsoft.com/office/drawing/2017/model3d" xmlns:w16cid="http://schemas.microsoft.com/office/word/2016/wordml/cid" xmlns:w16se="http://schemas.microsoft.com/office/word/2015/wordml/symex" xmlns:a14="http://schemas.microsoft.com/office/drawing/2010/main" xmlns:w="http://schemas.openxmlformats.org/wordprocessingml/2006/main" xmlns:w10="urn:schemas-microsoft-com:office:word" xmlns:v="urn:schemas-microsoft-com:vml" xmlns:o="urn:schemas-microsoft-com:office:office" xmlns:mv="urn:schemas-microsoft-com:mac:vml" xmlns:mo="http://schemas.microsoft.com/office/mac/office/2008/main" xmlns="" xmlns:arto="http://schemas.microsoft.com/office/word/2006/arto" xmlns:lc="http://schemas.openxmlformats.org/drawingml/2006/lockedCanvas">
                   <a:solidFill>
                     <a:srgbClr val="FFFFFF"/>
                   </a:solidFill>
                 </a14:hiddenFill>
               </a:ext>
               <a:ext uri="{91240B29-F687-4f45-9708-019B960494DF}">
-                <a14:hiddenLine xmlns:lc="http://schemas.openxmlformats.org/drawingml/2006/lockedCanvas" xmlns:arto="http://schemas.microsoft.com/office/word/2006/arto" xmlns="" xmlns:mo="http://schemas.microsoft.com/office/mac/office/2008/main" xmlns:mv="urn:schemas-microsoft-com:mac:vml" xmlns:o="urn:schemas-microsoft-com:office:office" xmlns:v="urn:schemas-microsoft-com:vml" xmlns:w10="urn:schemas-microsoft-com:office:word" xmlns:w="http://schemas.openxmlformats.org/wordprocessingml/2006/main" xmlns:a14="http://schemas.microsoft.com/office/drawing/2010/main" xmlns:w16se="http://schemas.microsoft.com/office/word/2015/wordml/symex" xmlns:w16cid="http://schemas.microsoft.com/office/word/2016/wordml/cid" xmlns:am3d="http://schemas.microsoft.com/office/drawing/2017/model3d" xmlns:aink="http://schemas.microsoft.com/office/drawing/2016/ink" xmlns:cx8="http://schemas.microsoft.com/office/drawing/2016/5/14/chartex" xmlns:cx7="http://schemas.microsoft.com/office/drawing/2016/5/13/chartex" xmlns:cx6="http://schemas.microsoft.com/office/drawing/2016/5/12/chartex" xmlns:cx5="http://schemas.microsoft.com/office/drawing/2016/5/11/chartex" xmlns:cx4="http://schemas.microsoft.com/office/drawing/2016/5/10/chartex" xmlns:cx3="http://schemas.microsoft.com/office/drawing/2016/5/9/chartex" xmlns:cx2="http://schemas.microsoft.com/office/drawing/2015/10/21/chartex" xmlns:cx1="http://schemas.microsoft.com/office/drawing/2015/9/8/chartex" xmlns:cx="http://schemas.microsoft.com/office/drawing/2014/chartex" xmlns:wps="http://schemas.microsoft.com/office/word/2010/wordprocessingShape" xmlns:wne="http://schemas.microsoft.com/office/word/2006/wordml" xmlns:wpi="http://schemas.microsoft.com/office/word/2010/wordprocessingInk" xmlns:wpg="http://schemas.microsoft.com/office/word/2010/wordprocessingGroup" xmlns:w15="http://schemas.microsoft.com/office/word/2012/wordml" xmlns:w14="http://schemas.microsoft.com/office/word/2010/wordml" xmlns:wp="http://schemas.openxmlformats.org/drawingml/2006/wordprocessingDrawing" xmlns:wp14="http://schemas.microsoft.com/office/word/2010/wordprocessingDrawing" xmlns:m="http://schemas.openxmlformats.org/officeDocument/2006/math" xmlns:mc="http://schemas.openxmlformats.org/markup-compatibility/2006" xmlns:wpc="http://schemas.microsoft.com/office/word/2010/wordprocessingCanvas" w="9525">
+                <a14:hiddenLine xmlns:wpc="http://schemas.microsoft.com/office/word/2010/wordprocessingCanvas" xmlns:mc="http://schemas.openxmlformats.org/markup-compatibility/2006" xmlns:m="http://schemas.openxmlformats.org/officeDocument/2006/math" xmlns:wp14="http://schemas.microsoft.com/office/word/2010/wordprocessingDrawing" xmlns:wp="http://schemas.openxmlformats.org/drawingml/2006/wordprocessingDrawing" xmlns:w14="http://schemas.microsoft.com/office/word/2010/wordml" xmlns:w15="http://schemas.microsoft.com/office/word/2012/wordml" xmlns:wpg="http://schemas.microsoft.com/office/word/2010/wordprocessingGroup" xmlns:wpi="http://schemas.microsoft.com/office/word/2010/wordprocessingInk" xmlns:wne="http://schemas.microsoft.com/office/word/2006/wordml" xmlns:wps="http://schemas.microsoft.com/office/word/2010/wordprocessingShape" xmlns:cx="http://schemas.microsoft.com/office/drawing/2014/chartex" xmlns:cx1="http://schemas.microsoft.com/office/drawing/2015/9/8/chartex" xmlns:cx2="http://schemas.microsoft.com/office/drawing/2015/10/21/chartex" xmlns:cx3="http://schemas.microsoft.com/office/drawing/2016/5/9/chartex" xmlns:cx4="http://schemas.microsoft.com/office/drawing/2016/5/10/chartex" xmlns:cx5="http://schemas.microsoft.com/office/drawing/2016/5/11/chartex" xmlns:cx6="http://schemas.microsoft.com/office/drawing/2016/5/12/chartex" xmlns:cx7="http://schemas.microsoft.com/office/drawing/2016/5/13/chartex" xmlns:cx8="http://schemas.microsoft.com/office/drawing/2016/5/14/chartex" xmlns:aink="http://schemas.microsoft.com/office/drawing/2016/ink" xmlns:am3d="http://schemas.microsoft.com/office/drawing/2017/model3d" xmlns:w16cid="http://schemas.microsoft.com/office/word/2016/wordml/cid" xmlns:w16se="http://schemas.microsoft.com/office/word/2015/wordml/symex" xmlns:a14="http://schemas.microsoft.com/office/drawing/2010/main" xmlns:w="http://schemas.openxmlformats.org/wordprocessingml/2006/main" xmlns:w10="urn:schemas-microsoft-com:office:word" xmlns:v="urn:schemas-microsoft-com:vml" xmlns:o="urn:schemas-microsoft-com:office:office" xmlns:mv="urn:schemas-microsoft-com:mac:vml" xmlns:mo="http://schemas.microsoft.com/office/mac/office/2008/main" xmlns="" xmlns:arto="http://schemas.microsoft.com/office/word/2006/arto" xmlns:lc="http://schemas.openxmlformats.org/drawingml/2006/lockedCanvas" w="9525">
                   <a:solidFill>
                     <a:srgbClr val="000000"/>
                   </a:solidFill>
@@ -4325,14 +4256,14 @@
             </a:ln>
             <a:extLst>
               <a:ext uri="{909E8E84-426E-40dd-AFC4-6F175D3DCCD1}">
-                <a14:hiddenFill xmlns:lc="http://schemas.openxmlformats.org/drawingml/2006/lockedCanvas" xmlns:arto="http://schemas.microsoft.com/office/word/2006/arto" xmlns="" xmlns:mo="http://schemas.microsoft.com/office/mac/office/2008/main" xmlns:mv="urn:schemas-microsoft-com:mac:vml" xmlns:o="urn:schemas-microsoft-com:office:office" xmlns:v="urn:schemas-microsoft-com:vml" xmlns:w10="urn:schemas-microsoft-com:office:word" xmlns:w="http://schemas.openxmlformats.org/wordprocessingml/2006/main" xmlns:a14="http://schemas.microsoft.com/office/drawing/2010/main" xmlns:w16se="http://schemas.microsoft.com/office/word/2015/wordml/symex" xmlns:w16cid="http://schemas.microsoft.com/office/word/2016/wordml/cid" xmlns:am3d="http://schemas.microsoft.com/office/drawing/2017/model3d" xmlns:aink="http://schemas.microsoft.com/office/drawing/2016/ink" xmlns:cx8="http://schemas.microsoft.com/office/drawing/2016/5/14/chartex" xmlns:cx7="http://schemas.microsoft.com/office/drawing/2016/5/13/chartex" xmlns:cx6="http://schemas.microsoft.com/office/drawing/2016/5/12/chartex" xmlns:cx5="http://schemas.microsoft.com/office/drawing/2016/5/11/chartex" xmlns:cx4="http://schemas.microsoft.com/office/drawing/2016/5/10/chartex" xmlns:cx3="http://schemas.microsoft.com/office/drawing/2016/5/9/chartex" xmlns:cx2="http://schemas.microsoft.com/office/drawing/2015/10/21/chartex" xmlns:cx1="http://schemas.microsoft.com/office/drawing/2015/9/8/chartex" xmlns:cx="http://schemas.microsoft.com/office/drawing/2014/chartex" xmlns:wps="http://schemas.microsoft.com/office/word/2010/wordprocessingShape" xmlns:wne="http://schemas.microsoft.com/office/word/2006/wordml" xmlns:wpi="http://schemas.microsoft.com/office/word/2010/wordprocessingInk" xmlns:wpg="http://schemas.microsoft.com/office/word/2010/wordprocessingGroup" xmlns:w15="http://schemas.microsoft.com/office/word/2012/wordml" xmlns:w14="http://schemas.microsoft.com/office/word/2010/wordml" xmlns:wp="http://schemas.openxmlformats.org/drawingml/2006/wordprocessingDrawing" xmlns:wp14="http://schemas.microsoft.com/office/word/2010/wordprocessingDrawing" xmlns:m="http://schemas.openxmlformats.org/officeDocument/2006/math" xmlns:mc="http://schemas.openxmlformats.org/markup-compatibility/2006" xmlns:wpc="http://schemas.microsoft.com/office/word/2010/wordprocessingCanvas">
+                <a14:hiddenFill xmlns:wpc="http://schemas.microsoft.com/office/word/2010/wordprocessingCanvas" xmlns:mc="http://schemas.openxmlformats.org/markup-compatibility/2006" xmlns:m="http://schemas.openxmlformats.org/officeDocument/2006/math" xmlns:wp14="http://schemas.microsoft.com/office/word/2010/wordprocessingDrawing" xmlns:wp="http://schemas.openxmlformats.org/drawingml/2006/wordprocessingDrawing" xmlns:w14="http://schemas.microsoft.com/office/word/2010/wordml" xmlns:w15="http://schemas.microsoft.com/office/word/2012/wordml" xmlns:wpg="http://schemas.microsoft.com/office/word/2010/wordprocessingGroup" xmlns:wpi="http://schemas.microsoft.com/office/word/2010/wordprocessingInk" xmlns:wne="http://schemas.microsoft.com/office/word/2006/wordml" xmlns:wps="http://schemas.microsoft.com/office/word/2010/wordprocessingShape" xmlns:cx="http://schemas.microsoft.com/office/drawing/2014/chartex" xmlns:cx1="http://schemas.microsoft.com/office/drawing/2015/9/8/chartex" xmlns:cx2="http://schemas.microsoft.com/office/drawing/2015/10/21/chartex" xmlns:cx3="http://schemas.microsoft.com/office/drawing/2016/5/9/chartex" xmlns:cx4="http://schemas.microsoft.com/office/drawing/2016/5/10/chartex" xmlns:cx5="http://schemas.microsoft.com/office/drawing/2016/5/11/chartex" xmlns:cx6="http://schemas.microsoft.com/office/drawing/2016/5/12/chartex" xmlns:cx7="http://schemas.microsoft.com/office/drawing/2016/5/13/chartex" xmlns:cx8="http://schemas.microsoft.com/office/drawing/2016/5/14/chartex" xmlns:aink="http://schemas.microsoft.com/office/drawing/2016/ink" xmlns:am3d="http://schemas.microsoft.com/office/drawing/2017/model3d" xmlns:w16cid="http://schemas.microsoft.com/office/word/2016/wordml/cid" xmlns:w16se="http://schemas.microsoft.com/office/word/2015/wordml/symex" xmlns:a14="http://schemas.microsoft.com/office/drawing/2010/main" xmlns:w="http://schemas.openxmlformats.org/wordprocessingml/2006/main" xmlns:w10="urn:schemas-microsoft-com:office:word" xmlns:v="urn:schemas-microsoft-com:vml" xmlns:o="urn:schemas-microsoft-com:office:office" xmlns:mv="urn:schemas-microsoft-com:mac:vml" xmlns:mo="http://schemas.microsoft.com/office/mac/office/2008/main" xmlns="" xmlns:arto="http://schemas.microsoft.com/office/word/2006/arto" xmlns:lc="http://schemas.openxmlformats.org/drawingml/2006/lockedCanvas">
                   <a:solidFill>
                     <a:srgbClr val="FFFFFF"/>
                   </a:solidFill>
                 </a14:hiddenFill>
               </a:ext>
               <a:ext uri="{91240B29-F687-4f45-9708-019B960494DF}">
-                <a14:hiddenLine xmlns:lc="http://schemas.openxmlformats.org/drawingml/2006/lockedCanvas" xmlns:arto="http://schemas.microsoft.com/office/word/2006/arto" xmlns="" xmlns:mo="http://schemas.microsoft.com/office/mac/office/2008/main" xmlns:mv="urn:schemas-microsoft-com:mac:vml" xmlns:o="urn:schemas-microsoft-com:office:office" xmlns:v="urn:schemas-microsoft-com:vml" xmlns:w10="urn:schemas-microsoft-com:office:word" xmlns:w="http://schemas.openxmlformats.org/wordprocessingml/2006/main" xmlns:a14="http://schemas.microsoft.com/office/drawing/2010/main" xmlns:w16se="http://schemas.microsoft.com/office/word/2015/wordml/symex" xmlns:w16cid="http://schemas.microsoft.com/office/word/2016/wordml/cid" xmlns:am3d="http://schemas.microsoft.com/office/drawing/2017/model3d" xmlns:aink="http://schemas.microsoft.com/office/drawing/2016/ink" xmlns:cx8="http://schemas.microsoft.com/office/drawing/2016/5/14/chartex" xmlns:cx7="http://schemas.microsoft.com/office/drawing/2016/5/13/chartex" xmlns:cx6="http://schemas.microsoft.com/office/drawing/2016/5/12/chartex" xmlns:cx5="http://schemas.microsoft.com/office/drawing/2016/5/11/chartex" xmlns:cx4="http://schemas.microsoft.com/office/drawing/2016/5/10/chartex" xmlns:cx3="http://schemas.microsoft.com/office/drawing/2016/5/9/chartex" xmlns:cx2="http://schemas.microsoft.com/office/drawing/2015/10/21/chartex" xmlns:cx1="http://schemas.microsoft.com/office/drawing/2015/9/8/chartex" xmlns:cx="http://schemas.microsoft.com/office/drawing/2014/chartex" xmlns:wps="http://schemas.microsoft.com/office/word/2010/wordprocessingShape" xmlns:wne="http://schemas.microsoft.com/office/word/2006/wordml" xmlns:wpi="http://schemas.microsoft.com/office/word/2010/wordprocessingInk" xmlns:wpg="http://schemas.microsoft.com/office/word/2010/wordprocessingGroup" xmlns:w15="http://schemas.microsoft.com/office/word/2012/wordml" xmlns:w14="http://schemas.microsoft.com/office/word/2010/wordml" xmlns:wp="http://schemas.openxmlformats.org/drawingml/2006/wordprocessingDrawing" xmlns:wp14="http://schemas.microsoft.com/office/word/2010/wordprocessingDrawing" xmlns:m="http://schemas.openxmlformats.org/officeDocument/2006/math" xmlns:mc="http://schemas.openxmlformats.org/markup-compatibility/2006" xmlns:wpc="http://schemas.microsoft.com/office/word/2010/wordprocessingCanvas" w="3175">
+                <a14:hiddenLine xmlns:wpc="http://schemas.microsoft.com/office/word/2010/wordprocessingCanvas" xmlns:mc="http://schemas.openxmlformats.org/markup-compatibility/2006" xmlns:m="http://schemas.openxmlformats.org/officeDocument/2006/math" xmlns:wp14="http://schemas.microsoft.com/office/word/2010/wordprocessingDrawing" xmlns:wp="http://schemas.openxmlformats.org/drawingml/2006/wordprocessingDrawing" xmlns:w14="http://schemas.microsoft.com/office/word/2010/wordml" xmlns:w15="http://schemas.microsoft.com/office/word/2012/wordml" xmlns:wpg="http://schemas.microsoft.com/office/word/2010/wordprocessingGroup" xmlns:wpi="http://schemas.microsoft.com/office/word/2010/wordprocessingInk" xmlns:wne="http://schemas.microsoft.com/office/word/2006/wordml" xmlns:wps="http://schemas.microsoft.com/office/word/2010/wordprocessingShape" xmlns:cx="http://schemas.microsoft.com/office/drawing/2014/chartex" xmlns:cx1="http://schemas.microsoft.com/office/drawing/2015/9/8/chartex" xmlns:cx2="http://schemas.microsoft.com/office/drawing/2015/10/21/chartex" xmlns:cx3="http://schemas.microsoft.com/office/drawing/2016/5/9/chartex" xmlns:cx4="http://schemas.microsoft.com/office/drawing/2016/5/10/chartex" xmlns:cx5="http://schemas.microsoft.com/office/drawing/2016/5/11/chartex" xmlns:cx6="http://schemas.microsoft.com/office/drawing/2016/5/12/chartex" xmlns:cx7="http://schemas.microsoft.com/office/drawing/2016/5/13/chartex" xmlns:cx8="http://schemas.microsoft.com/office/drawing/2016/5/14/chartex" xmlns:aink="http://schemas.microsoft.com/office/drawing/2016/ink" xmlns:am3d="http://schemas.microsoft.com/office/drawing/2017/model3d" xmlns:w16cid="http://schemas.microsoft.com/office/word/2016/wordml/cid" xmlns:w16se="http://schemas.microsoft.com/office/word/2015/wordml/symex" xmlns:a14="http://schemas.microsoft.com/office/drawing/2010/main" xmlns:w="http://schemas.openxmlformats.org/wordprocessingml/2006/main" xmlns:w10="urn:schemas-microsoft-com:office:word" xmlns:v="urn:schemas-microsoft-com:vml" xmlns:o="urn:schemas-microsoft-com:office:office" xmlns:mv="urn:schemas-microsoft-com:mac:vml" xmlns:mo="http://schemas.microsoft.com/office/mac/office/2008/main" xmlns="" xmlns:arto="http://schemas.microsoft.com/office/word/2006/arto" xmlns:lc="http://schemas.openxmlformats.org/drawingml/2006/lockedCanvas" w="3175">
                   <a:solidFill>
                     <a:srgbClr val="000000"/>
                   </a:solidFill>
@@ -4403,7 +4334,7 @@
             </a:ln>
             <a:extLst>
               <a:ext uri="{909E8E84-426E-40dd-AFC4-6F175D3DCCD1}">
-                <a14:hiddenFill xmlns:lc="http://schemas.openxmlformats.org/drawingml/2006/lockedCanvas" xmlns:arto="http://schemas.microsoft.com/office/word/2006/arto" xmlns="" xmlns:mo="http://schemas.microsoft.com/office/mac/office/2008/main" xmlns:mv="urn:schemas-microsoft-com:mac:vml" xmlns:o="urn:schemas-microsoft-com:office:office" xmlns:v="urn:schemas-microsoft-com:vml" xmlns:w10="urn:schemas-microsoft-com:office:word" xmlns:w="http://schemas.openxmlformats.org/wordprocessingml/2006/main" xmlns:a14="http://schemas.microsoft.com/office/drawing/2010/main" xmlns:w16se="http://schemas.microsoft.com/office/word/2015/wordml/symex" xmlns:w16cid="http://schemas.microsoft.com/office/word/2016/wordml/cid" xmlns:am3d="http://schemas.microsoft.com/office/drawing/2017/model3d" xmlns:aink="http://schemas.microsoft.com/office/drawing/2016/ink" xmlns:cx8="http://schemas.microsoft.com/office/drawing/2016/5/14/chartex" xmlns:cx7="http://schemas.microsoft.com/office/drawing/2016/5/13/chartex" xmlns:cx6="http://schemas.microsoft.com/office/drawing/2016/5/12/chartex" xmlns:cx5="http://schemas.microsoft.com/office/drawing/2016/5/11/chartex" xmlns:cx4="http://schemas.microsoft.com/office/drawing/2016/5/10/chartex" xmlns:cx3="http://schemas.microsoft.com/office/drawing/2016/5/9/chartex" xmlns:cx2="http://schemas.microsoft.com/office/drawing/2015/10/21/chartex" xmlns:cx1="http://schemas.microsoft.com/office/drawing/2015/9/8/chartex" xmlns:cx="http://schemas.microsoft.com/office/drawing/2014/chartex" xmlns:wps="http://schemas.microsoft.com/office/word/2010/wordprocessingShape" xmlns:wne="http://schemas.microsoft.com/office/word/2006/wordml" xmlns:wpi="http://schemas.microsoft.com/office/word/2010/wordprocessingInk" xmlns:wpg="http://schemas.microsoft.com/office/word/2010/wordprocessingGroup" xmlns:w15="http://schemas.microsoft.com/office/word/2012/wordml" xmlns:w14="http://schemas.microsoft.com/office/word/2010/wordml" xmlns:wp="http://schemas.openxmlformats.org/drawingml/2006/wordprocessingDrawing" xmlns:wp14="http://schemas.microsoft.com/office/word/2010/wordprocessingDrawing" xmlns:m="http://schemas.openxmlformats.org/officeDocument/2006/math" xmlns:mc="http://schemas.openxmlformats.org/markup-compatibility/2006" xmlns:wpc="http://schemas.microsoft.com/office/word/2010/wordprocessingCanvas">
+                <a14:hiddenFill xmlns:wpc="http://schemas.microsoft.com/office/word/2010/wordprocessingCanvas" xmlns:mc="http://schemas.openxmlformats.org/markup-compatibility/2006" xmlns:m="http://schemas.openxmlformats.org/officeDocument/2006/math" xmlns:wp14="http://schemas.microsoft.com/office/word/2010/wordprocessingDrawing" xmlns:wp="http://schemas.openxmlformats.org/drawingml/2006/wordprocessingDrawing" xmlns:w14="http://schemas.microsoft.com/office/word/2010/wordml" xmlns:w15="http://schemas.microsoft.com/office/word/2012/wordml" xmlns:wpg="http://schemas.microsoft.com/office/word/2010/wordprocessingGroup" xmlns:wpi="http://schemas.microsoft.com/office/word/2010/wordprocessingInk" xmlns:wne="http://schemas.microsoft.com/office/word/2006/wordml" xmlns:wps="http://schemas.microsoft.com/office/word/2010/wordprocessingShape" xmlns:cx="http://schemas.microsoft.com/office/drawing/2014/chartex" xmlns:cx1="http://schemas.microsoft.com/office/drawing/2015/9/8/chartex" xmlns:cx2="http://schemas.microsoft.com/office/drawing/2015/10/21/chartex" xmlns:cx3="http://schemas.microsoft.com/office/drawing/2016/5/9/chartex" xmlns:cx4="http://schemas.microsoft.com/office/drawing/2016/5/10/chartex" xmlns:cx5="http://schemas.microsoft.com/office/drawing/2016/5/11/chartex" xmlns:cx6="http://schemas.microsoft.com/office/drawing/2016/5/12/chartex" xmlns:cx7="http://schemas.microsoft.com/office/drawing/2016/5/13/chartex" xmlns:cx8="http://schemas.microsoft.com/office/drawing/2016/5/14/chartex" xmlns:aink="http://schemas.microsoft.com/office/drawing/2016/ink" xmlns:am3d="http://schemas.microsoft.com/office/drawing/2017/model3d" xmlns:w16cid="http://schemas.microsoft.com/office/word/2016/wordml/cid" xmlns:w16se="http://schemas.microsoft.com/office/word/2015/wordml/symex" xmlns:a14="http://schemas.microsoft.com/office/drawing/2010/main" xmlns:w="http://schemas.openxmlformats.org/wordprocessingml/2006/main" xmlns:w10="urn:schemas-microsoft-com:office:word" xmlns:v="urn:schemas-microsoft-com:vml" xmlns:o="urn:schemas-microsoft-com:office:office" xmlns:mv="urn:schemas-microsoft-com:mac:vml" xmlns:mo="http://schemas.microsoft.com/office/mac/office/2008/main" xmlns="" xmlns:arto="http://schemas.microsoft.com/office/word/2006/arto" xmlns:lc="http://schemas.openxmlformats.org/drawingml/2006/lockedCanvas">
                   <a:noFill/>
                 </a14:hiddenFill>
               </a:ext>
@@ -4438,14 +4369,14 @@
             </a:ln>
             <a:extLst>
               <a:ext uri="{909E8E84-426E-40dd-AFC4-6F175D3DCCD1}">
-                <a14:hiddenFill xmlns:lc="http://schemas.openxmlformats.org/drawingml/2006/lockedCanvas" xmlns:arto="http://schemas.microsoft.com/office/word/2006/arto" xmlns="" xmlns:mo="http://schemas.microsoft.com/office/mac/office/2008/main" xmlns:mv="urn:schemas-microsoft-com:mac:vml" xmlns:o="urn:schemas-microsoft-com:office:office" xmlns:v="urn:schemas-microsoft-com:vml" xmlns:w10="urn:schemas-microsoft-com:office:word" xmlns:w="http://schemas.openxmlformats.org/wordprocessingml/2006/main" xmlns:a14="http://schemas.microsoft.com/office/drawing/2010/main" xmlns:w16se="http://schemas.microsoft.com/office/word/2015/wordml/symex" xmlns:w16cid="http://schemas.microsoft.com/office/word/2016/wordml/cid" xmlns:am3d="http://schemas.microsoft.com/office/drawing/2017/model3d" xmlns:aink="http://schemas.microsoft.com/office/drawing/2016/ink" xmlns:cx8="http://schemas.microsoft.com/office/drawing/2016/5/14/chartex" xmlns:cx7="http://schemas.microsoft.com/office/drawing/2016/5/13/chartex" xmlns:cx6="http://schemas.microsoft.com/office/drawing/2016/5/12/chartex" xmlns:cx5="http://schemas.microsoft.com/office/drawing/2016/5/11/chartex" xmlns:cx4="http://schemas.microsoft.com/office/drawing/2016/5/10/chartex" xmlns:cx3="http://schemas.microsoft.com/office/drawing/2016/5/9/chartex" xmlns:cx2="http://schemas.microsoft.com/office/drawing/2015/10/21/chartex" xmlns:cx1="http://schemas.microsoft.com/office/drawing/2015/9/8/chartex" xmlns:cx="http://schemas.microsoft.com/office/drawing/2014/chartex" xmlns:wps="http://schemas.microsoft.com/office/word/2010/wordprocessingShape" xmlns:wne="http://schemas.microsoft.com/office/word/2006/wordml" xmlns:wpi="http://schemas.microsoft.com/office/word/2010/wordprocessingInk" xmlns:wpg="http://schemas.microsoft.com/office/word/2010/wordprocessingGroup" xmlns:w15="http://schemas.microsoft.com/office/word/2012/wordml" xmlns:w14="http://schemas.microsoft.com/office/word/2010/wordml" xmlns:wp="http://schemas.openxmlformats.org/drawingml/2006/wordprocessingDrawing" xmlns:wp14="http://schemas.microsoft.com/office/word/2010/wordprocessingDrawing" xmlns:m="http://schemas.openxmlformats.org/officeDocument/2006/math" xmlns:mc="http://schemas.openxmlformats.org/markup-compatibility/2006" xmlns:wpc="http://schemas.microsoft.com/office/word/2010/wordprocessingCanvas">
+                <a14:hiddenFill xmlns:wpc="http://schemas.microsoft.com/office/word/2010/wordprocessingCanvas" xmlns:mc="http://schemas.openxmlformats.org/markup-compatibility/2006" xmlns:m="http://schemas.openxmlformats.org/officeDocument/2006/math" xmlns:wp14="http://schemas.microsoft.com/office/word/2010/wordprocessingDrawing" xmlns:wp="http://schemas.openxmlformats.org/drawingml/2006/wordprocessingDrawing" xmlns:w14="http://schemas.microsoft.com/office/word/2010/wordml" xmlns:w15="http://schemas.microsoft.com/office/word/2012/wordml" xmlns:wpg="http://schemas.microsoft.com/office/word/2010/wordprocessingGroup" xmlns:wpi="http://schemas.microsoft.com/office/word/2010/wordprocessingInk" xmlns:wne="http://schemas.microsoft.com/office/word/2006/wordml" xmlns:wps="http://schemas.microsoft.com/office/word/2010/wordprocessingShape" xmlns:cx="http://schemas.microsoft.com/office/drawing/2014/chartex" xmlns:cx1="http://schemas.microsoft.com/office/drawing/2015/9/8/chartex" xmlns:cx2="http://schemas.microsoft.com/office/drawing/2015/10/21/chartex" xmlns:cx3="http://schemas.microsoft.com/office/drawing/2016/5/9/chartex" xmlns:cx4="http://schemas.microsoft.com/office/drawing/2016/5/10/chartex" xmlns:cx5="http://schemas.microsoft.com/office/drawing/2016/5/11/chartex" xmlns:cx6="http://schemas.microsoft.com/office/drawing/2016/5/12/chartex" xmlns:cx7="http://schemas.microsoft.com/office/drawing/2016/5/13/chartex" xmlns:cx8="http://schemas.microsoft.com/office/drawing/2016/5/14/chartex" xmlns:aink="http://schemas.microsoft.com/office/drawing/2016/ink" xmlns:am3d="http://schemas.microsoft.com/office/drawing/2017/model3d" xmlns:w16cid="http://schemas.microsoft.com/office/word/2016/wordml/cid" xmlns:w16se="http://schemas.microsoft.com/office/word/2015/wordml/symex" xmlns:a14="http://schemas.microsoft.com/office/drawing/2010/main" xmlns:w="http://schemas.openxmlformats.org/wordprocessingml/2006/main" xmlns:w10="urn:schemas-microsoft-com:office:word" xmlns:v="urn:schemas-microsoft-com:vml" xmlns:o="urn:schemas-microsoft-com:office:office" xmlns:mv="urn:schemas-microsoft-com:mac:vml" xmlns:mo="http://schemas.microsoft.com/office/mac/office/2008/main" xmlns="" xmlns:arto="http://schemas.microsoft.com/office/word/2006/arto" xmlns:lc="http://schemas.openxmlformats.org/drawingml/2006/lockedCanvas">
                   <a:solidFill>
                     <a:srgbClr val="FFFFFF"/>
                   </a:solidFill>
                 </a14:hiddenFill>
               </a:ext>
               <a:ext uri="{91240B29-F687-4f45-9708-019B960494DF}">
-                <a14:hiddenLine xmlns:lc="http://schemas.openxmlformats.org/drawingml/2006/lockedCanvas" xmlns:arto="http://schemas.microsoft.com/office/word/2006/arto" xmlns="" xmlns:mo="http://schemas.microsoft.com/office/mac/office/2008/main" xmlns:mv="urn:schemas-microsoft-com:mac:vml" xmlns:o="urn:schemas-microsoft-com:office:office" xmlns:v="urn:schemas-microsoft-com:vml" xmlns:w10="urn:schemas-microsoft-com:office:word" xmlns:w="http://schemas.openxmlformats.org/wordprocessingml/2006/main" xmlns:a14="http://schemas.microsoft.com/office/drawing/2010/main" xmlns:w16se="http://schemas.microsoft.com/office/word/2015/wordml/symex" xmlns:w16cid="http://schemas.microsoft.com/office/word/2016/wordml/cid" xmlns:am3d="http://schemas.microsoft.com/office/drawing/2017/model3d" xmlns:aink="http://schemas.microsoft.com/office/drawing/2016/ink" xmlns:cx8="http://schemas.microsoft.com/office/drawing/2016/5/14/chartex" xmlns:cx7="http://schemas.microsoft.com/office/drawing/2016/5/13/chartex" xmlns:cx6="http://schemas.microsoft.com/office/drawing/2016/5/12/chartex" xmlns:cx5="http://schemas.microsoft.com/office/drawing/2016/5/11/chartex" xmlns:cx4="http://schemas.microsoft.com/office/drawing/2016/5/10/chartex" xmlns:cx3="http://schemas.microsoft.com/office/drawing/2016/5/9/chartex" xmlns:cx2="http://schemas.microsoft.com/office/drawing/2015/10/21/chartex" xmlns:cx1="http://schemas.microsoft.com/office/drawing/2015/9/8/chartex" xmlns:cx="http://schemas.microsoft.com/office/drawing/2014/chartex" xmlns:wps="http://schemas.microsoft.com/office/word/2010/wordprocessingShape" xmlns:wne="http://schemas.microsoft.com/office/word/2006/wordml" xmlns:wpi="http://schemas.microsoft.com/office/word/2010/wordprocessingInk" xmlns:wpg="http://schemas.microsoft.com/office/word/2010/wordprocessingGroup" xmlns:w15="http://schemas.microsoft.com/office/word/2012/wordml" xmlns:w14="http://schemas.microsoft.com/office/word/2010/wordml" xmlns:wp="http://schemas.openxmlformats.org/drawingml/2006/wordprocessingDrawing" xmlns:wp14="http://schemas.microsoft.com/office/word/2010/wordprocessingDrawing" xmlns:m="http://schemas.openxmlformats.org/officeDocument/2006/math" xmlns:mc="http://schemas.openxmlformats.org/markup-compatibility/2006" xmlns:wpc="http://schemas.microsoft.com/office/word/2010/wordprocessingCanvas" w="3175">
+                <a14:hiddenLine xmlns:wpc="http://schemas.microsoft.com/office/word/2010/wordprocessingCanvas" xmlns:mc="http://schemas.openxmlformats.org/markup-compatibility/2006" xmlns:m="http://schemas.openxmlformats.org/officeDocument/2006/math" xmlns:wp14="http://schemas.microsoft.com/office/word/2010/wordprocessingDrawing" xmlns:wp="http://schemas.openxmlformats.org/drawingml/2006/wordprocessingDrawing" xmlns:w14="http://schemas.microsoft.com/office/word/2010/wordml" xmlns:w15="http://schemas.microsoft.com/office/word/2012/wordml" xmlns:wpg="http://schemas.microsoft.com/office/word/2010/wordprocessingGroup" xmlns:wpi="http://schemas.microsoft.com/office/word/2010/wordprocessingInk" xmlns:wne="http://schemas.microsoft.com/office/word/2006/wordml" xmlns:wps="http://schemas.microsoft.com/office/word/2010/wordprocessingShape" xmlns:cx="http://schemas.microsoft.com/office/drawing/2014/chartex" xmlns:cx1="http://schemas.microsoft.com/office/drawing/2015/9/8/chartex" xmlns:cx2="http://schemas.microsoft.com/office/drawing/2015/10/21/chartex" xmlns:cx3="http://schemas.microsoft.com/office/drawing/2016/5/9/chartex" xmlns:cx4="http://schemas.microsoft.com/office/drawing/2016/5/10/chartex" xmlns:cx5="http://schemas.microsoft.com/office/drawing/2016/5/11/chartex" xmlns:cx6="http://schemas.microsoft.com/office/drawing/2016/5/12/chartex" xmlns:cx7="http://schemas.microsoft.com/office/drawing/2016/5/13/chartex" xmlns:cx8="http://schemas.microsoft.com/office/drawing/2016/5/14/chartex" xmlns:aink="http://schemas.microsoft.com/office/drawing/2016/ink" xmlns:am3d="http://schemas.microsoft.com/office/drawing/2017/model3d" xmlns:w16cid="http://schemas.microsoft.com/office/word/2016/wordml/cid" xmlns:w16se="http://schemas.microsoft.com/office/word/2015/wordml/symex" xmlns:a14="http://schemas.microsoft.com/office/drawing/2010/main" xmlns:w="http://schemas.openxmlformats.org/wordprocessingml/2006/main" xmlns:w10="urn:schemas-microsoft-com:office:word" xmlns:v="urn:schemas-microsoft-com:vml" xmlns:o="urn:schemas-microsoft-com:office:office" xmlns:mv="urn:schemas-microsoft-com:mac:vml" xmlns:mo="http://schemas.microsoft.com/office/mac/office/2008/main" xmlns="" xmlns:arto="http://schemas.microsoft.com/office/word/2006/arto" xmlns:lc="http://schemas.openxmlformats.org/drawingml/2006/lockedCanvas" w="3175">
                   <a:solidFill>
                     <a:srgbClr val="000000"/>
                   </a:solidFill>
@@ -4537,75 +4468,6 @@
           </p:txBody>
         </p:sp>
       </p:grpSp>
-      <p:sp>
-        <p:nvSpPr>
-          <p:cNvPr id="25" name="Rectangle 40">
-            <a:extLst>
-              <a:ext uri="{FF2B5EF4-FFF2-40B4-BE49-F238E27FC236}">
-                <a16:creationId xmlns:a16="http://schemas.microsoft.com/office/drawing/2014/main" id="{B3B0FAC9-F431-8B78-7C6F-55D1B5CF0911}"/>
-              </a:ext>
-            </a:extLst>
-          </p:cNvPr>
-          <p:cNvSpPr>
-            <a:spLocks noChangeArrowheads="1"/>
-          </p:cNvSpPr>
-          <p:nvPr/>
-        </p:nvSpPr>
-        <p:spPr bwMode="auto">
-          <a:xfrm>
-            <a:off x="1816360" y="5226636"/>
-            <a:ext cx="184731" cy="369332"/>
-          </a:xfrm>
-          <a:prstGeom prst="rect">
-            <a:avLst/>
-          </a:prstGeom>
-          <a:noFill/>
-          <a:ln>
-            <a:noFill/>
-          </a:ln>
-          <a:effectLst/>
-          <a:extLst>
-            <a:ext uri="{909E8E84-426E-40DD-AFC4-6F175D3DCCD1}">
-              <a14:hiddenFill xmlns:a14="http://schemas.microsoft.com/office/drawing/2010/main">
-                <a:solidFill>
-                  <a:schemeClr val="accent1"/>
-                </a:solidFill>
-              </a14:hiddenFill>
-            </a:ext>
-            <a:ext uri="{91240B29-F687-4F45-9708-019B960494DF}">
-              <a14:hiddenLine xmlns:a14="http://schemas.microsoft.com/office/drawing/2010/main" w="9525">
-                <a:solidFill>
-                  <a:schemeClr val="tx1"/>
-                </a:solidFill>
-                <a:miter lim="800000"/>
-                <a:headEnd/>
-                <a:tailEnd/>
-              </a14:hiddenLine>
-            </a:ext>
-            <a:ext uri="{AF507438-7753-43E0-B8FC-AC1667EBCBE1}">
-              <a14:hiddenEffects xmlns:a14="http://schemas.microsoft.com/office/drawing/2010/main">
-                <a:effectLst>
-                  <a:outerShdw dist="35921" dir="2700000" algn="ctr" rotWithShape="0">
-                    <a:schemeClr val="bg2"/>
-                  </a:outerShdw>
-                </a:effectLst>
-              </a14:hiddenEffects>
-            </a:ext>
-          </a:extLst>
-        </p:spPr>
-        <p:txBody>
-          <a:bodyPr vert="horz" wrap="none" lIns="91440" tIns="45720" rIns="91440" bIns="45720" numCol="1" anchor="ctr" anchorCtr="0" compatLnSpc="1">
-            <a:prstTxWarp prst="textNoShape">
-              <a:avLst/>
-            </a:prstTxWarp>
-            <a:spAutoFit/>
-          </a:bodyPr>
-          <a:lstStyle/>
-          <a:p>
-            <a:endParaRPr lang="en-US"/>
-          </a:p>
-        </p:txBody>
-      </p:sp>
     </p:spTree>
     <p:extLst>
       <p:ext uri="{BB962C8B-B14F-4D97-AF65-F5344CB8AC3E}">

</xml_diff>